<commit_message>
Adding The Data Mining Final Revisions
</commit_message>
<xml_diff>
--- a/DataMining{Dr_Sara_Shaker&Dr_Amira_Rizk}/Helping/Cover.pptx
+++ b/DataMining{Dr_Sara_Shaker&Dr_Amira_Rizk}/Helping/Cover.pptx
@@ -7,6 +7,7 @@
   <p:sldIdLst>
     <p:sldId id="256" r:id="rId2"/>
     <p:sldId id="257" r:id="rId3"/>
+    <p:sldId id="258" r:id="rId4"/>
   </p:sldIdLst>
   <p:sldSz cx="6858000" cy="9906000" type="A4"/>
   <p:notesSz cx="6858000" cy="9144000"/>
@@ -105,6 +106,11 @@
       </a:defRPr>
     </a:lvl9pPr>
   </p:defaultTextStyle>
+  <p:extLst>
+    <p:ext uri="{EFAFB233-063F-42B5-8137-9DF3F51BA10A}">
+      <p15:sldGuideLst xmlns:p15="http://schemas.microsoft.com/office/powerpoint/2012/main"/>
+    </p:ext>
+  </p:extLst>
 </p:presentation>
 </file>
 
@@ -239,7 +245,7 @@
           <a:p>
             <a:fld id="{B3273CB4-2363-4939-B93D-48CB9EB232D4}" type="datetimeFigureOut">
               <a:rPr lang="en-US" smtClean="0"/>
-              <a:t>5/18/2020</a:t>
+              <a:t>5/19/2020</a:t>
             </a:fld>
             <a:endParaRPr lang="en-US"/>
           </a:p>
@@ -409,7 +415,7 @@
           <a:p>
             <a:fld id="{B3273CB4-2363-4939-B93D-48CB9EB232D4}" type="datetimeFigureOut">
               <a:rPr lang="en-US" smtClean="0"/>
-              <a:t>5/18/2020</a:t>
+              <a:t>5/19/2020</a:t>
             </a:fld>
             <a:endParaRPr lang="en-US"/>
           </a:p>
@@ -589,7 +595,7 @@
           <a:p>
             <a:fld id="{B3273CB4-2363-4939-B93D-48CB9EB232D4}" type="datetimeFigureOut">
               <a:rPr lang="en-US" smtClean="0"/>
-              <a:t>5/18/2020</a:t>
+              <a:t>5/19/2020</a:t>
             </a:fld>
             <a:endParaRPr lang="en-US"/>
           </a:p>
@@ -759,7 +765,7 @@
           <a:p>
             <a:fld id="{B3273CB4-2363-4939-B93D-48CB9EB232D4}" type="datetimeFigureOut">
               <a:rPr lang="en-US" smtClean="0"/>
-              <a:t>5/18/2020</a:t>
+              <a:t>5/19/2020</a:t>
             </a:fld>
             <a:endParaRPr lang="en-US"/>
           </a:p>
@@ -1003,7 +1009,7 @@
           <a:p>
             <a:fld id="{B3273CB4-2363-4939-B93D-48CB9EB232D4}" type="datetimeFigureOut">
               <a:rPr lang="en-US" smtClean="0"/>
-              <a:t>5/18/2020</a:t>
+              <a:t>5/19/2020</a:t>
             </a:fld>
             <a:endParaRPr lang="en-US"/>
           </a:p>
@@ -1235,7 +1241,7 @@
           <a:p>
             <a:fld id="{B3273CB4-2363-4939-B93D-48CB9EB232D4}" type="datetimeFigureOut">
               <a:rPr lang="en-US" smtClean="0"/>
-              <a:t>5/18/2020</a:t>
+              <a:t>5/19/2020</a:t>
             </a:fld>
             <a:endParaRPr lang="en-US"/>
           </a:p>
@@ -1602,7 +1608,7 @@
           <a:p>
             <a:fld id="{B3273CB4-2363-4939-B93D-48CB9EB232D4}" type="datetimeFigureOut">
               <a:rPr lang="en-US" smtClean="0"/>
-              <a:t>5/18/2020</a:t>
+              <a:t>5/19/2020</a:t>
             </a:fld>
             <a:endParaRPr lang="en-US"/>
           </a:p>
@@ -1720,7 +1726,7 @@
           <a:p>
             <a:fld id="{B3273CB4-2363-4939-B93D-48CB9EB232D4}" type="datetimeFigureOut">
               <a:rPr lang="en-US" smtClean="0"/>
-              <a:t>5/18/2020</a:t>
+              <a:t>5/19/2020</a:t>
             </a:fld>
             <a:endParaRPr lang="en-US"/>
           </a:p>
@@ -1815,7 +1821,7 @@
           <a:p>
             <a:fld id="{B3273CB4-2363-4939-B93D-48CB9EB232D4}" type="datetimeFigureOut">
               <a:rPr lang="en-US" smtClean="0"/>
-              <a:t>5/18/2020</a:t>
+              <a:t>5/19/2020</a:t>
             </a:fld>
             <a:endParaRPr lang="en-US"/>
           </a:p>
@@ -2092,7 +2098,7 @@
           <a:p>
             <a:fld id="{B3273CB4-2363-4939-B93D-48CB9EB232D4}" type="datetimeFigureOut">
               <a:rPr lang="en-US" smtClean="0"/>
-              <a:t>5/18/2020</a:t>
+              <a:t>5/19/2020</a:t>
             </a:fld>
             <a:endParaRPr lang="en-US"/>
           </a:p>
@@ -2349,7 +2355,7 @@
           <a:p>
             <a:fld id="{B3273CB4-2363-4939-B93D-48CB9EB232D4}" type="datetimeFigureOut">
               <a:rPr lang="en-US" smtClean="0"/>
-              <a:t>5/18/2020</a:t>
+              <a:t>5/19/2020</a:t>
             </a:fld>
             <a:endParaRPr lang="en-US"/>
           </a:p>
@@ -2562,7 +2568,7 @@
           <a:p>
             <a:fld id="{B3273CB4-2363-4939-B93D-48CB9EB232D4}" type="datetimeFigureOut">
               <a:rPr lang="en-US" smtClean="0"/>
-              <a:t>5/18/2020</a:t>
+              <a:t>5/19/2020</a:t>
             </a:fld>
             <a:endParaRPr lang="en-US"/>
           </a:p>
@@ -3528,6 +3534,358 @@
 </p:sld>
 </file>
 
+<file path=ppt/slides/slide3.xml><?xml version="1.0" encoding="utf-8"?>
+<p:sld xmlns:a="http://schemas.openxmlformats.org/drawingml/2006/main" xmlns:r="http://schemas.openxmlformats.org/officeDocument/2006/relationships" xmlns:p="http://schemas.openxmlformats.org/presentationml/2006/main">
+  <p:cSld>
+    <p:spTree>
+      <p:nvGrpSpPr>
+        <p:cNvPr id="1" name=""/>
+        <p:cNvGrpSpPr/>
+        <p:nvPr/>
+      </p:nvGrpSpPr>
+      <p:grpSpPr>
+        <a:xfrm>
+          <a:off x="0" y="0"/>
+          <a:ext cx="0" cy="0"/>
+          <a:chOff x="0" y="0"/>
+          <a:chExt cx="0" cy="0"/>
+        </a:xfrm>
+      </p:grpSpPr>
+      <p:sp>
+        <p:nvSpPr>
+          <p:cNvPr id="5" name="Oval 4">
+            <a:extLst>
+              <a:ext uri="{FF2B5EF4-FFF2-40B4-BE49-F238E27FC236}">
+                <a16:creationId xmlns:a16="http://schemas.microsoft.com/office/drawing/2014/main" id="{9229F4DE-F8F2-4F2F-B190-5EF21C76F9FB}"/>
+              </a:ext>
+            </a:extLst>
+          </p:cNvPr>
+          <p:cNvSpPr/>
+          <p:nvPr/>
+        </p:nvSpPr>
+        <p:spPr>
+          <a:xfrm>
+            <a:off x="800100" y="2739979"/>
+            <a:ext cx="5257800" cy="4777348"/>
+          </a:xfrm>
+          <a:prstGeom prst="ellipse">
+            <a:avLst/>
+          </a:prstGeom>
+          <a:noFill/>
+          <a:ln w="9525" cap="flat" cmpd="sng" algn="ctr">
+            <a:solidFill>
+              <a:schemeClr val="accent3"/>
+            </a:solidFill>
+            <a:prstDash val="solid"/>
+            <a:round/>
+            <a:headEnd type="none" w="med" len="med"/>
+            <a:tailEnd type="none" w="med" len="med"/>
+          </a:ln>
+        </p:spPr>
+        <p:style>
+          <a:lnRef idx="0">
+            <a:scrgbClr r="0" g="0" b="0"/>
+          </a:lnRef>
+          <a:fillRef idx="0">
+            <a:scrgbClr r="0" g="0" b="0"/>
+          </a:fillRef>
+          <a:effectRef idx="0">
+            <a:scrgbClr r="0" g="0" b="0"/>
+          </a:effectRef>
+          <a:fontRef idx="minor">
+            <a:schemeClr val="accent3"/>
+          </a:fontRef>
+        </p:style>
+        <p:txBody>
+          <a:bodyPr rtlCol="0" anchor="ctr"/>
+          <a:lstStyle/>
+          <a:p>
+            <a:pPr algn="ctr"/>
+            <a:endParaRPr lang="en-US" dirty="0"/>
+          </a:p>
+        </p:txBody>
+      </p:sp>
+      <p:sp>
+        <p:nvSpPr>
+          <p:cNvPr id="4" name="Rectangle 3">
+            <a:extLst>
+              <a:ext uri="{FF2B5EF4-FFF2-40B4-BE49-F238E27FC236}">
+                <a16:creationId xmlns:a16="http://schemas.microsoft.com/office/drawing/2014/main" id="{5ED97542-AAD4-4C86-B407-6E27E98BB98E}"/>
+              </a:ext>
+            </a:extLst>
+          </p:cNvPr>
+          <p:cNvSpPr/>
+          <p:nvPr/>
+        </p:nvSpPr>
+        <p:spPr>
+          <a:xfrm>
+            <a:off x="1623281" y="6015318"/>
+            <a:ext cx="3611437" cy="923330"/>
+          </a:xfrm>
+          <a:prstGeom prst="rect">
+            <a:avLst/>
+          </a:prstGeom>
+          <a:noFill/>
+        </p:spPr>
+        <p:txBody>
+          <a:bodyPr wrap="none" lIns="91440" tIns="45720" rIns="91440" bIns="45720">
+            <a:spAutoFit/>
+          </a:bodyPr>
+          <a:lstStyle/>
+          <a:p>
+            <a:pPr algn="ctr"/>
+            <a:r>
+              <a:rPr lang="en-US" sz="5400" b="0" cap="none" spc="0" dirty="0">
+                <a:ln w="0"/>
+                <a:solidFill>
+                  <a:schemeClr val="accent1"/>
+                </a:solidFill>
+                <a:effectLst>
+                  <a:outerShdw blurRad="38100" dist="25400" dir="5400000" algn="ctr" rotWithShape="0">
+                    <a:srgbClr val="6E747A">
+                      <a:alpha val="43000"/>
+                    </a:srgbClr>
+                  </a:outerShdw>
+                </a:effectLst>
+              </a:rPr>
+              <a:t>Data Mining</a:t>
+            </a:r>
+          </a:p>
+        </p:txBody>
+      </p:sp>
+      <p:pic>
+        <p:nvPicPr>
+          <p:cNvPr id="1028" name="Picture 4" descr="Networking Network Security Projects at Rs 15000/on wards ...">
+            <a:extLst>
+              <a:ext uri="{FF2B5EF4-FFF2-40B4-BE49-F238E27FC236}">
+                <a16:creationId xmlns:a16="http://schemas.microsoft.com/office/drawing/2014/main" id="{62A8AC9D-1293-4E53-B156-9C7447418BEC}"/>
+              </a:ext>
+            </a:extLst>
+          </p:cNvPr>
+          <p:cNvPicPr>
+            <a:picLocks noChangeAspect="1" noChangeArrowheads="1"/>
+          </p:cNvPicPr>
+          <p:nvPr/>
+        </p:nvPicPr>
+        <p:blipFill>
+          <a:blip r:embed="rId2">
+            <a:extLst>
+              <a:ext uri="{28A0092B-C50C-407E-A947-70E740481C1C}">
+                <a14:useLocalDpi xmlns:a14="http://schemas.microsoft.com/office/drawing/2010/main" val="0"/>
+              </a:ext>
+            </a:extLst>
+          </a:blip>
+          <a:srcRect/>
+          <a:stretch>
+            <a:fillRect/>
+          </a:stretch>
+        </p:blipFill>
+        <p:spPr bwMode="auto">
+          <a:xfrm>
+            <a:off x="1" y="0"/>
+            <a:ext cx="6858000" cy="4777348"/>
+          </a:xfrm>
+          <a:prstGeom prst="rect">
+            <a:avLst/>
+          </a:prstGeom>
+          <a:noFill/>
+          <a:extLst>
+            <a:ext uri="{909E8E84-426E-40DD-AFC4-6F175D3DCCD1}">
+              <a14:hiddenFill xmlns:a14="http://schemas.microsoft.com/office/drawing/2010/main">
+                <a:solidFill>
+                  <a:srgbClr val="FFFFFF"/>
+                </a:solidFill>
+              </a14:hiddenFill>
+            </a:ext>
+          </a:extLst>
+        </p:spPr>
+      </p:pic>
+      <p:pic>
+        <p:nvPicPr>
+          <p:cNvPr id="1026" name="Picture 2" descr="5 Benefits of Data Mining for your Marketing Strategy: Part 1">
+            <a:extLst>
+              <a:ext uri="{FF2B5EF4-FFF2-40B4-BE49-F238E27FC236}">
+                <a16:creationId xmlns:a16="http://schemas.microsoft.com/office/drawing/2014/main" id="{9CEF86DF-35FF-462A-A238-516093124CE9}"/>
+              </a:ext>
+            </a:extLst>
+          </p:cNvPr>
+          <p:cNvPicPr>
+            <a:picLocks noChangeAspect="1" noChangeArrowheads="1"/>
+          </p:cNvPicPr>
+          <p:nvPr/>
+        </p:nvPicPr>
+        <p:blipFill>
+          <a:blip r:embed="rId3">
+            <a:extLst>
+              <a:ext uri="{28A0092B-C50C-407E-A947-70E740481C1C}">
+                <a14:useLocalDpi xmlns:a14="http://schemas.microsoft.com/office/drawing/2010/main" val="0"/>
+              </a:ext>
+            </a:extLst>
+          </a:blip>
+          <a:srcRect/>
+          <a:stretch>
+            <a:fillRect/>
+          </a:stretch>
+        </p:blipFill>
+        <p:spPr bwMode="auto">
+          <a:xfrm>
+            <a:off x="1905000" y="3101788"/>
+            <a:ext cx="3048000" cy="3048000"/>
+          </a:xfrm>
+          <a:prstGeom prst="rect">
+            <a:avLst/>
+          </a:prstGeom>
+          <a:noFill/>
+          <a:extLst>
+            <a:ext uri="{909E8E84-426E-40DD-AFC4-6F175D3DCCD1}">
+              <a14:hiddenFill xmlns:a14="http://schemas.microsoft.com/office/drawing/2010/main">
+                <a:solidFill>
+                  <a:srgbClr val="FFFFFF"/>
+                </a:solidFill>
+              </a14:hiddenFill>
+            </a:ext>
+          </a:extLst>
+        </p:spPr>
+      </p:pic>
+      <p:sp>
+        <p:nvSpPr>
+          <p:cNvPr id="2" name="Rectangle 1">
+            <a:extLst>
+              <a:ext uri="{FF2B5EF4-FFF2-40B4-BE49-F238E27FC236}">
+                <a16:creationId xmlns:a16="http://schemas.microsoft.com/office/drawing/2014/main" id="{B3BFBFE3-7D46-42C3-8C92-078F3521080C}"/>
+              </a:ext>
+            </a:extLst>
+          </p:cNvPr>
+          <p:cNvSpPr/>
+          <p:nvPr/>
+        </p:nvSpPr>
+        <p:spPr>
+          <a:xfrm>
+            <a:off x="586176" y="7517327"/>
+            <a:ext cx="5685659" cy="1661993"/>
+          </a:xfrm>
+          <a:prstGeom prst="rect">
+            <a:avLst/>
+          </a:prstGeom>
+          <a:noFill/>
+        </p:spPr>
+        <p:txBody>
+          <a:bodyPr wrap="none" lIns="91440" tIns="45720" rIns="91440" bIns="45720">
+            <a:spAutoFit/>
+          </a:bodyPr>
+          <a:lstStyle/>
+          <a:p>
+            <a:pPr algn="ctr"/>
+            <a:r>
+              <a:rPr lang="en-US" sz="4800" b="1" cap="none" spc="0" dirty="0">
+                <a:ln w="10160">
+                  <a:solidFill>
+                    <a:schemeClr val="accent5"/>
+                  </a:solidFill>
+                  <a:prstDash val="solid"/>
+                </a:ln>
+                <a:solidFill>
+                  <a:srgbClr val="FFFFFF"/>
+                </a:solidFill>
+                <a:effectLst>
+                  <a:outerShdw blurRad="38100" dist="22860" dir="5400000" algn="tl" rotWithShape="0">
+                    <a:srgbClr val="000000">
+                      <a:alpha val="30000"/>
+                    </a:srgbClr>
+                  </a:outerShdw>
+                </a:effectLst>
+              </a:rPr>
+              <a:t> Tour 2</a:t>
+            </a:r>
+          </a:p>
+          <a:p>
+            <a:pPr algn="ctr"/>
+            <a:r>
+              <a:rPr lang="en-US" sz="5400" b="1" cap="none" spc="0" dirty="0">
+                <a:ln w="10160">
+                  <a:solidFill>
+                    <a:schemeClr val="accent5"/>
+                  </a:solidFill>
+                  <a:prstDash val="solid"/>
+                </a:ln>
+                <a:solidFill>
+                  <a:srgbClr val="FFFFFF"/>
+                </a:solidFill>
+                <a:effectLst>
+                  <a:outerShdw blurRad="38100" dist="22860" dir="5400000" algn="tl" rotWithShape="0">
+                    <a:srgbClr val="000000">
+                      <a:alpha val="30000"/>
+                    </a:srgbClr>
+                  </a:outerShdw>
+                </a:effectLst>
+              </a:rPr>
+              <a:t>Data Preprocessing</a:t>
+            </a:r>
+          </a:p>
+        </p:txBody>
+      </p:sp>
+      <p:sp>
+        <p:nvSpPr>
+          <p:cNvPr id="3" name="Rectangle 2">
+            <a:extLst>
+              <a:ext uri="{FF2B5EF4-FFF2-40B4-BE49-F238E27FC236}">
+                <a16:creationId xmlns:a16="http://schemas.microsoft.com/office/drawing/2014/main" id="{17B300DD-505E-4E71-AF3D-93A6037B5063}"/>
+              </a:ext>
+            </a:extLst>
+          </p:cNvPr>
+          <p:cNvSpPr/>
+          <p:nvPr/>
+        </p:nvSpPr>
+        <p:spPr>
+          <a:xfrm rot="18742739">
+            <a:off x="-803462" y="508780"/>
+            <a:ext cx="3207124" cy="595732"/>
+          </a:xfrm>
+          <a:prstGeom prst="rect">
+            <a:avLst/>
+          </a:prstGeom>
+        </p:spPr>
+        <p:style>
+          <a:lnRef idx="2">
+            <a:schemeClr val="accent4">
+              <a:shade val="50000"/>
+            </a:schemeClr>
+          </a:lnRef>
+          <a:fillRef idx="1">
+            <a:schemeClr val="accent4"/>
+          </a:fillRef>
+          <a:effectRef idx="0">
+            <a:schemeClr val="accent4"/>
+          </a:effectRef>
+          <a:fontRef idx="minor">
+            <a:schemeClr val="lt1"/>
+          </a:fontRef>
+        </p:style>
+        <p:txBody>
+          <a:bodyPr rtlCol="0" anchor="ctr"/>
+          <a:lstStyle/>
+          <a:p>
+            <a:pPr algn="ctr"/>
+            <a:r>
+              <a:rPr lang="en-US" sz="2400" b="1" dirty="0"/>
+              <a:t>Tour Version</a:t>
+            </a:r>
+          </a:p>
+        </p:txBody>
+      </p:sp>
+    </p:spTree>
+    <p:extLst>
+      <p:ext uri="{BB962C8B-B14F-4D97-AF65-F5344CB8AC3E}">
+        <p14:creationId xmlns:p14="http://schemas.microsoft.com/office/powerpoint/2010/main" val="4288245762"/>
+      </p:ext>
+    </p:extLst>
+  </p:cSld>
+  <p:clrMapOvr>
+    <a:masterClrMapping/>
+  </p:clrMapOvr>
+</p:sld>
+</file>
+
 <file path=ppt/theme/theme1.xml><?xml version="1.0" encoding="utf-8"?>
 <a:theme xmlns:a="http://schemas.openxmlformats.org/drawingml/2006/main" name="Office Theme">
   <a:themeElements>

</xml_diff>

<commit_message>
Adding Labs of  Data Mining
</commit_message>
<xml_diff>
--- a/DataMining{Dr_Sara_Shaker&Dr_Amira_Rizk}/Helping/Cover.pptx
+++ b/DataMining{Dr_Sara_Shaker&Dr_Amira_Rizk}/Helping/Cover.pptx
@@ -8,6 +8,9 @@
     <p:sldId id="256" r:id="rId2"/>
     <p:sldId id="257" r:id="rId3"/>
     <p:sldId id="258" r:id="rId4"/>
+    <p:sldId id="259" r:id="rId5"/>
+    <p:sldId id="260" r:id="rId6"/>
+    <p:sldId id="261" r:id="rId7"/>
   </p:sldIdLst>
   <p:sldSz cx="6858000" cy="9906000" type="A4"/>
   <p:notesSz cx="6858000" cy="9144000"/>
@@ -245,7 +248,7 @@
           <a:p>
             <a:fld id="{B3273CB4-2363-4939-B93D-48CB9EB232D4}" type="datetimeFigureOut">
               <a:rPr lang="en-US" smtClean="0"/>
-              <a:t>5/19/2020</a:t>
+              <a:t>6/4/2020</a:t>
             </a:fld>
             <a:endParaRPr lang="en-US"/>
           </a:p>
@@ -415,7 +418,7 @@
           <a:p>
             <a:fld id="{B3273CB4-2363-4939-B93D-48CB9EB232D4}" type="datetimeFigureOut">
               <a:rPr lang="en-US" smtClean="0"/>
-              <a:t>5/19/2020</a:t>
+              <a:t>6/4/2020</a:t>
             </a:fld>
             <a:endParaRPr lang="en-US"/>
           </a:p>
@@ -595,7 +598,7 @@
           <a:p>
             <a:fld id="{B3273CB4-2363-4939-B93D-48CB9EB232D4}" type="datetimeFigureOut">
               <a:rPr lang="en-US" smtClean="0"/>
-              <a:t>5/19/2020</a:t>
+              <a:t>6/4/2020</a:t>
             </a:fld>
             <a:endParaRPr lang="en-US"/>
           </a:p>
@@ -765,7 +768,7 @@
           <a:p>
             <a:fld id="{B3273CB4-2363-4939-B93D-48CB9EB232D4}" type="datetimeFigureOut">
               <a:rPr lang="en-US" smtClean="0"/>
-              <a:t>5/19/2020</a:t>
+              <a:t>6/4/2020</a:t>
             </a:fld>
             <a:endParaRPr lang="en-US"/>
           </a:p>
@@ -1009,7 +1012,7 @@
           <a:p>
             <a:fld id="{B3273CB4-2363-4939-B93D-48CB9EB232D4}" type="datetimeFigureOut">
               <a:rPr lang="en-US" smtClean="0"/>
-              <a:t>5/19/2020</a:t>
+              <a:t>6/4/2020</a:t>
             </a:fld>
             <a:endParaRPr lang="en-US"/>
           </a:p>
@@ -1241,7 +1244,7 @@
           <a:p>
             <a:fld id="{B3273CB4-2363-4939-B93D-48CB9EB232D4}" type="datetimeFigureOut">
               <a:rPr lang="en-US" smtClean="0"/>
-              <a:t>5/19/2020</a:t>
+              <a:t>6/4/2020</a:t>
             </a:fld>
             <a:endParaRPr lang="en-US"/>
           </a:p>
@@ -1608,7 +1611,7 @@
           <a:p>
             <a:fld id="{B3273CB4-2363-4939-B93D-48CB9EB232D4}" type="datetimeFigureOut">
               <a:rPr lang="en-US" smtClean="0"/>
-              <a:t>5/19/2020</a:t>
+              <a:t>6/4/2020</a:t>
             </a:fld>
             <a:endParaRPr lang="en-US"/>
           </a:p>
@@ -1726,7 +1729,7 @@
           <a:p>
             <a:fld id="{B3273CB4-2363-4939-B93D-48CB9EB232D4}" type="datetimeFigureOut">
               <a:rPr lang="en-US" smtClean="0"/>
-              <a:t>5/19/2020</a:t>
+              <a:t>6/4/2020</a:t>
             </a:fld>
             <a:endParaRPr lang="en-US"/>
           </a:p>
@@ -1821,7 +1824,7 @@
           <a:p>
             <a:fld id="{B3273CB4-2363-4939-B93D-48CB9EB232D4}" type="datetimeFigureOut">
               <a:rPr lang="en-US" smtClean="0"/>
-              <a:t>5/19/2020</a:t>
+              <a:t>6/4/2020</a:t>
             </a:fld>
             <a:endParaRPr lang="en-US"/>
           </a:p>
@@ -2098,7 +2101,7 @@
           <a:p>
             <a:fld id="{B3273CB4-2363-4939-B93D-48CB9EB232D4}" type="datetimeFigureOut">
               <a:rPr lang="en-US" smtClean="0"/>
-              <a:t>5/19/2020</a:t>
+              <a:t>6/4/2020</a:t>
             </a:fld>
             <a:endParaRPr lang="en-US"/>
           </a:p>
@@ -2355,7 +2358,7 @@
           <a:p>
             <a:fld id="{B3273CB4-2363-4939-B93D-48CB9EB232D4}" type="datetimeFigureOut">
               <a:rPr lang="en-US" smtClean="0"/>
-              <a:t>5/19/2020</a:t>
+              <a:t>6/4/2020</a:t>
             </a:fld>
             <a:endParaRPr lang="en-US"/>
           </a:p>
@@ -2568,7 +2571,7 @@
           <a:p>
             <a:fld id="{B3273CB4-2363-4939-B93D-48CB9EB232D4}" type="datetimeFigureOut">
               <a:rPr lang="en-US" smtClean="0"/>
-              <a:t>5/19/2020</a:t>
+              <a:t>6/4/2020</a:t>
             </a:fld>
             <a:endParaRPr lang="en-US"/>
           </a:p>
@@ -3886,6 +3889,1119 @@
 </p:sld>
 </file>
 
+<file path=ppt/slides/slide4.xml><?xml version="1.0" encoding="utf-8"?>
+<p:sld xmlns:a="http://schemas.openxmlformats.org/drawingml/2006/main" xmlns:r="http://schemas.openxmlformats.org/officeDocument/2006/relationships" xmlns:p="http://schemas.openxmlformats.org/presentationml/2006/main">
+  <p:cSld>
+    <p:spTree>
+      <p:nvGrpSpPr>
+        <p:cNvPr id="1" name=""/>
+        <p:cNvGrpSpPr/>
+        <p:nvPr/>
+      </p:nvGrpSpPr>
+      <p:grpSpPr>
+        <a:xfrm>
+          <a:off x="0" y="0"/>
+          <a:ext cx="0" cy="0"/>
+          <a:chOff x="0" y="0"/>
+          <a:chExt cx="0" cy="0"/>
+        </a:xfrm>
+      </p:grpSpPr>
+      <p:sp>
+        <p:nvSpPr>
+          <p:cNvPr id="5" name="Oval 4">
+            <a:extLst>
+              <a:ext uri="{FF2B5EF4-FFF2-40B4-BE49-F238E27FC236}">
+                <a16:creationId xmlns:a16="http://schemas.microsoft.com/office/drawing/2014/main" id="{9229F4DE-F8F2-4F2F-B190-5EF21C76F9FB}"/>
+              </a:ext>
+            </a:extLst>
+          </p:cNvPr>
+          <p:cNvSpPr/>
+          <p:nvPr/>
+        </p:nvSpPr>
+        <p:spPr>
+          <a:xfrm>
+            <a:off x="800100" y="2739979"/>
+            <a:ext cx="5257800" cy="4777348"/>
+          </a:xfrm>
+          <a:prstGeom prst="ellipse">
+            <a:avLst/>
+          </a:prstGeom>
+          <a:noFill/>
+          <a:ln w="9525" cap="flat" cmpd="sng" algn="ctr">
+            <a:solidFill>
+              <a:schemeClr val="accent3"/>
+            </a:solidFill>
+            <a:prstDash val="solid"/>
+            <a:round/>
+            <a:headEnd type="none" w="med" len="med"/>
+            <a:tailEnd type="none" w="med" len="med"/>
+          </a:ln>
+        </p:spPr>
+        <p:style>
+          <a:lnRef idx="0">
+            <a:scrgbClr r="0" g="0" b="0"/>
+          </a:lnRef>
+          <a:fillRef idx="0">
+            <a:scrgbClr r="0" g="0" b="0"/>
+          </a:fillRef>
+          <a:effectRef idx="0">
+            <a:scrgbClr r="0" g="0" b="0"/>
+          </a:effectRef>
+          <a:fontRef idx="minor">
+            <a:schemeClr val="accent3"/>
+          </a:fontRef>
+        </p:style>
+        <p:txBody>
+          <a:bodyPr rtlCol="0" anchor="ctr"/>
+          <a:lstStyle/>
+          <a:p>
+            <a:pPr algn="ctr"/>
+            <a:endParaRPr lang="en-US" dirty="0"/>
+          </a:p>
+        </p:txBody>
+      </p:sp>
+      <p:sp>
+        <p:nvSpPr>
+          <p:cNvPr id="4" name="Rectangle 3">
+            <a:extLst>
+              <a:ext uri="{FF2B5EF4-FFF2-40B4-BE49-F238E27FC236}">
+                <a16:creationId xmlns:a16="http://schemas.microsoft.com/office/drawing/2014/main" id="{5ED97542-AAD4-4C86-B407-6E27E98BB98E}"/>
+              </a:ext>
+            </a:extLst>
+          </p:cNvPr>
+          <p:cNvSpPr/>
+          <p:nvPr/>
+        </p:nvSpPr>
+        <p:spPr>
+          <a:xfrm>
+            <a:off x="1623281" y="6015318"/>
+            <a:ext cx="3611437" cy="923330"/>
+          </a:xfrm>
+          <a:prstGeom prst="rect">
+            <a:avLst/>
+          </a:prstGeom>
+          <a:noFill/>
+        </p:spPr>
+        <p:txBody>
+          <a:bodyPr wrap="none" lIns="91440" tIns="45720" rIns="91440" bIns="45720">
+            <a:spAutoFit/>
+          </a:bodyPr>
+          <a:lstStyle/>
+          <a:p>
+            <a:pPr algn="ctr"/>
+            <a:r>
+              <a:rPr lang="en-US" sz="5400" b="0" cap="none" spc="0" dirty="0">
+                <a:ln w="0"/>
+                <a:solidFill>
+                  <a:schemeClr val="accent1"/>
+                </a:solidFill>
+                <a:effectLst>
+                  <a:outerShdw blurRad="38100" dist="25400" dir="5400000" algn="ctr" rotWithShape="0">
+                    <a:srgbClr val="6E747A">
+                      <a:alpha val="43000"/>
+                    </a:srgbClr>
+                  </a:outerShdw>
+                </a:effectLst>
+              </a:rPr>
+              <a:t>Data Mining</a:t>
+            </a:r>
+          </a:p>
+        </p:txBody>
+      </p:sp>
+      <p:pic>
+        <p:nvPicPr>
+          <p:cNvPr id="1028" name="Picture 4" descr="Networking Network Security Projects at Rs 15000/on wards ...">
+            <a:extLst>
+              <a:ext uri="{FF2B5EF4-FFF2-40B4-BE49-F238E27FC236}">
+                <a16:creationId xmlns:a16="http://schemas.microsoft.com/office/drawing/2014/main" id="{62A8AC9D-1293-4E53-B156-9C7447418BEC}"/>
+              </a:ext>
+            </a:extLst>
+          </p:cNvPr>
+          <p:cNvPicPr>
+            <a:picLocks noChangeAspect="1" noChangeArrowheads="1"/>
+          </p:cNvPicPr>
+          <p:nvPr/>
+        </p:nvPicPr>
+        <p:blipFill>
+          <a:blip r:embed="rId2">
+            <a:extLst>
+              <a:ext uri="{28A0092B-C50C-407E-A947-70E740481C1C}">
+                <a14:useLocalDpi xmlns:a14="http://schemas.microsoft.com/office/drawing/2010/main" val="0"/>
+              </a:ext>
+            </a:extLst>
+          </a:blip>
+          <a:srcRect/>
+          <a:stretch>
+            <a:fillRect/>
+          </a:stretch>
+        </p:blipFill>
+        <p:spPr bwMode="auto">
+          <a:xfrm>
+            <a:off x="1" y="0"/>
+            <a:ext cx="6858000" cy="4777348"/>
+          </a:xfrm>
+          <a:prstGeom prst="rect">
+            <a:avLst/>
+          </a:prstGeom>
+          <a:noFill/>
+          <a:extLst>
+            <a:ext uri="{909E8E84-426E-40DD-AFC4-6F175D3DCCD1}">
+              <a14:hiddenFill xmlns:a14="http://schemas.microsoft.com/office/drawing/2010/main">
+                <a:solidFill>
+                  <a:srgbClr val="FFFFFF"/>
+                </a:solidFill>
+              </a14:hiddenFill>
+            </a:ext>
+          </a:extLst>
+        </p:spPr>
+      </p:pic>
+      <p:pic>
+        <p:nvPicPr>
+          <p:cNvPr id="1026" name="Picture 2" descr="5 Benefits of Data Mining for your Marketing Strategy: Part 1">
+            <a:extLst>
+              <a:ext uri="{FF2B5EF4-FFF2-40B4-BE49-F238E27FC236}">
+                <a16:creationId xmlns:a16="http://schemas.microsoft.com/office/drawing/2014/main" id="{9CEF86DF-35FF-462A-A238-516093124CE9}"/>
+              </a:ext>
+            </a:extLst>
+          </p:cNvPr>
+          <p:cNvPicPr>
+            <a:picLocks noChangeAspect="1" noChangeArrowheads="1"/>
+          </p:cNvPicPr>
+          <p:nvPr/>
+        </p:nvPicPr>
+        <p:blipFill>
+          <a:blip r:embed="rId3">
+            <a:extLst>
+              <a:ext uri="{28A0092B-C50C-407E-A947-70E740481C1C}">
+                <a14:useLocalDpi xmlns:a14="http://schemas.microsoft.com/office/drawing/2010/main" val="0"/>
+              </a:ext>
+            </a:extLst>
+          </a:blip>
+          <a:srcRect/>
+          <a:stretch>
+            <a:fillRect/>
+          </a:stretch>
+        </p:blipFill>
+        <p:spPr bwMode="auto">
+          <a:xfrm>
+            <a:off x="1905000" y="3101788"/>
+            <a:ext cx="3048000" cy="3048000"/>
+          </a:xfrm>
+          <a:prstGeom prst="rect">
+            <a:avLst/>
+          </a:prstGeom>
+          <a:noFill/>
+          <a:extLst>
+            <a:ext uri="{909E8E84-426E-40DD-AFC4-6F175D3DCCD1}">
+              <a14:hiddenFill xmlns:a14="http://schemas.microsoft.com/office/drawing/2010/main">
+                <a:solidFill>
+                  <a:srgbClr val="FFFFFF"/>
+                </a:solidFill>
+              </a14:hiddenFill>
+            </a:ext>
+          </a:extLst>
+        </p:spPr>
+      </p:pic>
+      <p:sp>
+        <p:nvSpPr>
+          <p:cNvPr id="2" name="Rectangle 1">
+            <a:extLst>
+              <a:ext uri="{FF2B5EF4-FFF2-40B4-BE49-F238E27FC236}">
+                <a16:creationId xmlns:a16="http://schemas.microsoft.com/office/drawing/2014/main" id="{B3BFBFE3-7D46-42C3-8C92-078F3521080C}"/>
+              </a:ext>
+            </a:extLst>
+          </p:cNvPr>
+          <p:cNvSpPr/>
+          <p:nvPr/>
+        </p:nvSpPr>
+        <p:spPr>
+          <a:xfrm>
+            <a:off x="202933" y="7517327"/>
+            <a:ext cx="6452151" cy="1569660"/>
+          </a:xfrm>
+          <a:prstGeom prst="rect">
+            <a:avLst/>
+          </a:prstGeom>
+          <a:noFill/>
+        </p:spPr>
+        <p:txBody>
+          <a:bodyPr wrap="none" lIns="91440" tIns="45720" rIns="91440" bIns="45720">
+            <a:spAutoFit/>
+          </a:bodyPr>
+          <a:lstStyle/>
+          <a:p>
+            <a:pPr algn="ctr"/>
+            <a:r>
+              <a:rPr lang="en-US" sz="4800" b="1" cap="none" spc="0" dirty="0">
+                <a:ln w="10160">
+                  <a:solidFill>
+                    <a:schemeClr val="accent5"/>
+                  </a:solidFill>
+                  <a:prstDash val="solid"/>
+                </a:ln>
+                <a:solidFill>
+                  <a:srgbClr val="FFFFFF"/>
+                </a:solidFill>
+                <a:effectLst>
+                  <a:outerShdw blurRad="38100" dist="22860" dir="5400000" algn="tl" rotWithShape="0">
+                    <a:srgbClr val="000000">
+                      <a:alpha val="30000"/>
+                    </a:srgbClr>
+                  </a:outerShdw>
+                </a:effectLst>
+              </a:rPr>
+              <a:t> Tour 3</a:t>
+            </a:r>
+          </a:p>
+          <a:p>
+            <a:pPr algn="ctr"/>
+            <a:r>
+              <a:rPr lang="en-US" sz="4800" b="1" cap="none" spc="0" dirty="0">
+                <a:ln w="10160">
+                  <a:solidFill>
+                    <a:schemeClr val="accent5"/>
+                  </a:solidFill>
+                  <a:prstDash val="solid"/>
+                </a:ln>
+                <a:solidFill>
+                  <a:srgbClr val="FFFFFF"/>
+                </a:solidFill>
+                <a:effectLst>
+                  <a:outerShdw blurRad="38100" dist="22860" dir="5400000" algn="tl" rotWithShape="0">
+                    <a:srgbClr val="000000">
+                      <a:alpha val="30000"/>
+                    </a:srgbClr>
+                  </a:outerShdw>
+                </a:effectLst>
+              </a:rPr>
+              <a:t>Mining Frequent Pattern</a:t>
+            </a:r>
+          </a:p>
+        </p:txBody>
+      </p:sp>
+      <p:sp>
+        <p:nvSpPr>
+          <p:cNvPr id="3" name="Rectangle 2">
+            <a:extLst>
+              <a:ext uri="{FF2B5EF4-FFF2-40B4-BE49-F238E27FC236}">
+                <a16:creationId xmlns:a16="http://schemas.microsoft.com/office/drawing/2014/main" id="{17B300DD-505E-4E71-AF3D-93A6037B5063}"/>
+              </a:ext>
+            </a:extLst>
+          </p:cNvPr>
+          <p:cNvSpPr/>
+          <p:nvPr/>
+        </p:nvSpPr>
+        <p:spPr>
+          <a:xfrm rot="18742739">
+            <a:off x="-803462" y="508780"/>
+            <a:ext cx="3207124" cy="595732"/>
+          </a:xfrm>
+          <a:prstGeom prst="rect">
+            <a:avLst/>
+          </a:prstGeom>
+        </p:spPr>
+        <p:style>
+          <a:lnRef idx="2">
+            <a:schemeClr val="accent4">
+              <a:shade val="50000"/>
+            </a:schemeClr>
+          </a:lnRef>
+          <a:fillRef idx="1">
+            <a:schemeClr val="accent4"/>
+          </a:fillRef>
+          <a:effectRef idx="0">
+            <a:schemeClr val="accent4"/>
+          </a:effectRef>
+          <a:fontRef idx="minor">
+            <a:schemeClr val="lt1"/>
+          </a:fontRef>
+        </p:style>
+        <p:txBody>
+          <a:bodyPr rtlCol="0" anchor="ctr"/>
+          <a:lstStyle/>
+          <a:p>
+            <a:pPr algn="ctr"/>
+            <a:r>
+              <a:rPr lang="en-US" sz="2400" b="1" dirty="0"/>
+              <a:t>Tour Version</a:t>
+            </a:r>
+          </a:p>
+        </p:txBody>
+      </p:sp>
+    </p:spTree>
+    <p:extLst>
+      <p:ext uri="{BB962C8B-B14F-4D97-AF65-F5344CB8AC3E}">
+        <p14:creationId xmlns:p14="http://schemas.microsoft.com/office/powerpoint/2010/main" val="2344838740"/>
+      </p:ext>
+    </p:extLst>
+  </p:cSld>
+  <p:clrMapOvr>
+    <a:masterClrMapping/>
+  </p:clrMapOvr>
+</p:sld>
+</file>
+
+<file path=ppt/slides/slide5.xml><?xml version="1.0" encoding="utf-8"?>
+<p:sld xmlns:a="http://schemas.openxmlformats.org/drawingml/2006/main" xmlns:r="http://schemas.openxmlformats.org/officeDocument/2006/relationships" xmlns:p="http://schemas.openxmlformats.org/presentationml/2006/main">
+  <p:cSld>
+    <p:spTree>
+      <p:nvGrpSpPr>
+        <p:cNvPr id="1" name=""/>
+        <p:cNvGrpSpPr/>
+        <p:nvPr/>
+      </p:nvGrpSpPr>
+      <p:grpSpPr>
+        <a:xfrm>
+          <a:off x="0" y="0"/>
+          <a:ext cx="0" cy="0"/>
+          <a:chOff x="0" y="0"/>
+          <a:chExt cx="0" cy="0"/>
+        </a:xfrm>
+      </p:grpSpPr>
+      <p:sp>
+        <p:nvSpPr>
+          <p:cNvPr id="5" name="Oval 4">
+            <a:extLst>
+              <a:ext uri="{FF2B5EF4-FFF2-40B4-BE49-F238E27FC236}">
+                <a16:creationId xmlns:a16="http://schemas.microsoft.com/office/drawing/2014/main" id="{9229F4DE-F8F2-4F2F-B190-5EF21C76F9FB}"/>
+              </a:ext>
+            </a:extLst>
+          </p:cNvPr>
+          <p:cNvSpPr/>
+          <p:nvPr/>
+        </p:nvSpPr>
+        <p:spPr>
+          <a:xfrm>
+            <a:off x="800100" y="2739979"/>
+            <a:ext cx="5257800" cy="4777348"/>
+          </a:xfrm>
+          <a:prstGeom prst="ellipse">
+            <a:avLst/>
+          </a:prstGeom>
+          <a:noFill/>
+          <a:ln w="9525" cap="flat" cmpd="sng" algn="ctr">
+            <a:solidFill>
+              <a:schemeClr val="accent3"/>
+            </a:solidFill>
+            <a:prstDash val="solid"/>
+            <a:round/>
+            <a:headEnd type="none" w="med" len="med"/>
+            <a:tailEnd type="none" w="med" len="med"/>
+          </a:ln>
+        </p:spPr>
+        <p:style>
+          <a:lnRef idx="0">
+            <a:scrgbClr r="0" g="0" b="0"/>
+          </a:lnRef>
+          <a:fillRef idx="0">
+            <a:scrgbClr r="0" g="0" b="0"/>
+          </a:fillRef>
+          <a:effectRef idx="0">
+            <a:scrgbClr r="0" g="0" b="0"/>
+          </a:effectRef>
+          <a:fontRef idx="minor">
+            <a:schemeClr val="accent3"/>
+          </a:fontRef>
+        </p:style>
+        <p:txBody>
+          <a:bodyPr rtlCol="0" anchor="ctr"/>
+          <a:lstStyle/>
+          <a:p>
+            <a:pPr algn="ctr"/>
+            <a:endParaRPr lang="en-US" dirty="0"/>
+          </a:p>
+        </p:txBody>
+      </p:sp>
+      <p:sp>
+        <p:nvSpPr>
+          <p:cNvPr id="4" name="Rectangle 3">
+            <a:extLst>
+              <a:ext uri="{FF2B5EF4-FFF2-40B4-BE49-F238E27FC236}">
+                <a16:creationId xmlns:a16="http://schemas.microsoft.com/office/drawing/2014/main" id="{5ED97542-AAD4-4C86-B407-6E27E98BB98E}"/>
+              </a:ext>
+            </a:extLst>
+          </p:cNvPr>
+          <p:cNvSpPr/>
+          <p:nvPr/>
+        </p:nvSpPr>
+        <p:spPr>
+          <a:xfrm>
+            <a:off x="1623281" y="6015318"/>
+            <a:ext cx="3611437" cy="923330"/>
+          </a:xfrm>
+          <a:prstGeom prst="rect">
+            <a:avLst/>
+          </a:prstGeom>
+          <a:noFill/>
+        </p:spPr>
+        <p:txBody>
+          <a:bodyPr wrap="none" lIns="91440" tIns="45720" rIns="91440" bIns="45720">
+            <a:spAutoFit/>
+          </a:bodyPr>
+          <a:lstStyle/>
+          <a:p>
+            <a:pPr algn="ctr"/>
+            <a:r>
+              <a:rPr lang="en-US" sz="5400" b="0" cap="none" spc="0" dirty="0">
+                <a:ln w="0"/>
+                <a:solidFill>
+                  <a:schemeClr val="accent1"/>
+                </a:solidFill>
+                <a:effectLst>
+                  <a:outerShdw blurRad="38100" dist="25400" dir="5400000" algn="ctr" rotWithShape="0">
+                    <a:srgbClr val="6E747A">
+                      <a:alpha val="43000"/>
+                    </a:srgbClr>
+                  </a:outerShdw>
+                </a:effectLst>
+              </a:rPr>
+              <a:t>Data Mining</a:t>
+            </a:r>
+          </a:p>
+        </p:txBody>
+      </p:sp>
+      <p:pic>
+        <p:nvPicPr>
+          <p:cNvPr id="1028" name="Picture 4" descr="Networking Network Security Projects at Rs 15000/on wards ...">
+            <a:extLst>
+              <a:ext uri="{FF2B5EF4-FFF2-40B4-BE49-F238E27FC236}">
+                <a16:creationId xmlns:a16="http://schemas.microsoft.com/office/drawing/2014/main" id="{62A8AC9D-1293-4E53-B156-9C7447418BEC}"/>
+              </a:ext>
+            </a:extLst>
+          </p:cNvPr>
+          <p:cNvPicPr>
+            <a:picLocks noChangeAspect="1" noChangeArrowheads="1"/>
+          </p:cNvPicPr>
+          <p:nvPr/>
+        </p:nvPicPr>
+        <p:blipFill>
+          <a:blip r:embed="rId2">
+            <a:extLst>
+              <a:ext uri="{28A0092B-C50C-407E-A947-70E740481C1C}">
+                <a14:useLocalDpi xmlns:a14="http://schemas.microsoft.com/office/drawing/2010/main" val="0"/>
+              </a:ext>
+            </a:extLst>
+          </a:blip>
+          <a:srcRect/>
+          <a:stretch>
+            <a:fillRect/>
+          </a:stretch>
+        </p:blipFill>
+        <p:spPr bwMode="auto">
+          <a:xfrm>
+            <a:off x="1" y="0"/>
+            <a:ext cx="6858000" cy="4777348"/>
+          </a:xfrm>
+          <a:prstGeom prst="rect">
+            <a:avLst/>
+          </a:prstGeom>
+          <a:noFill/>
+          <a:extLst>
+            <a:ext uri="{909E8E84-426E-40DD-AFC4-6F175D3DCCD1}">
+              <a14:hiddenFill xmlns:a14="http://schemas.microsoft.com/office/drawing/2010/main">
+                <a:solidFill>
+                  <a:srgbClr val="FFFFFF"/>
+                </a:solidFill>
+              </a14:hiddenFill>
+            </a:ext>
+          </a:extLst>
+        </p:spPr>
+      </p:pic>
+      <p:pic>
+        <p:nvPicPr>
+          <p:cNvPr id="1026" name="Picture 2" descr="5 Benefits of Data Mining for your Marketing Strategy: Part 1">
+            <a:extLst>
+              <a:ext uri="{FF2B5EF4-FFF2-40B4-BE49-F238E27FC236}">
+                <a16:creationId xmlns:a16="http://schemas.microsoft.com/office/drawing/2014/main" id="{9CEF86DF-35FF-462A-A238-516093124CE9}"/>
+              </a:ext>
+            </a:extLst>
+          </p:cNvPr>
+          <p:cNvPicPr>
+            <a:picLocks noChangeAspect="1" noChangeArrowheads="1"/>
+          </p:cNvPicPr>
+          <p:nvPr/>
+        </p:nvPicPr>
+        <p:blipFill>
+          <a:blip r:embed="rId3">
+            <a:extLst>
+              <a:ext uri="{28A0092B-C50C-407E-A947-70E740481C1C}">
+                <a14:useLocalDpi xmlns:a14="http://schemas.microsoft.com/office/drawing/2010/main" val="0"/>
+              </a:ext>
+            </a:extLst>
+          </a:blip>
+          <a:srcRect/>
+          <a:stretch>
+            <a:fillRect/>
+          </a:stretch>
+        </p:blipFill>
+        <p:spPr bwMode="auto">
+          <a:xfrm>
+            <a:off x="1905000" y="3101788"/>
+            <a:ext cx="3048000" cy="3048000"/>
+          </a:xfrm>
+          <a:prstGeom prst="rect">
+            <a:avLst/>
+          </a:prstGeom>
+          <a:noFill/>
+          <a:extLst>
+            <a:ext uri="{909E8E84-426E-40DD-AFC4-6F175D3DCCD1}">
+              <a14:hiddenFill xmlns:a14="http://schemas.microsoft.com/office/drawing/2010/main">
+                <a:solidFill>
+                  <a:srgbClr val="FFFFFF"/>
+                </a:solidFill>
+              </a14:hiddenFill>
+            </a:ext>
+          </a:extLst>
+        </p:spPr>
+      </p:pic>
+      <p:sp>
+        <p:nvSpPr>
+          <p:cNvPr id="2" name="Rectangle 1">
+            <a:extLst>
+              <a:ext uri="{FF2B5EF4-FFF2-40B4-BE49-F238E27FC236}">
+                <a16:creationId xmlns:a16="http://schemas.microsoft.com/office/drawing/2014/main" id="{B3BFBFE3-7D46-42C3-8C92-078F3521080C}"/>
+              </a:ext>
+            </a:extLst>
+          </p:cNvPr>
+          <p:cNvSpPr/>
+          <p:nvPr/>
+        </p:nvSpPr>
+        <p:spPr>
+          <a:xfrm>
+            <a:off x="1663782" y="7517327"/>
+            <a:ext cx="3530454" cy="1569660"/>
+          </a:xfrm>
+          <a:prstGeom prst="rect">
+            <a:avLst/>
+          </a:prstGeom>
+          <a:noFill/>
+        </p:spPr>
+        <p:txBody>
+          <a:bodyPr wrap="none" lIns="91440" tIns="45720" rIns="91440" bIns="45720">
+            <a:spAutoFit/>
+          </a:bodyPr>
+          <a:lstStyle/>
+          <a:p>
+            <a:pPr algn="ctr"/>
+            <a:r>
+              <a:rPr lang="en-US" sz="4800" b="1" cap="none" spc="0" dirty="0">
+                <a:ln w="10160">
+                  <a:solidFill>
+                    <a:schemeClr val="accent5"/>
+                  </a:solidFill>
+                  <a:prstDash val="solid"/>
+                </a:ln>
+                <a:solidFill>
+                  <a:srgbClr val="FFFFFF"/>
+                </a:solidFill>
+                <a:effectLst>
+                  <a:outerShdw blurRad="38100" dist="22860" dir="5400000" algn="tl" rotWithShape="0">
+                    <a:srgbClr val="000000">
+                      <a:alpha val="30000"/>
+                    </a:srgbClr>
+                  </a:outerShdw>
+                </a:effectLst>
+              </a:rPr>
+              <a:t> Tour 4</a:t>
+            </a:r>
+          </a:p>
+          <a:p>
+            <a:pPr algn="ctr"/>
+            <a:r>
+              <a:rPr lang="en-US" sz="4800" b="1" cap="none" spc="0" dirty="0">
+                <a:ln w="10160">
+                  <a:solidFill>
+                    <a:schemeClr val="accent5"/>
+                  </a:solidFill>
+                  <a:prstDash val="solid"/>
+                </a:ln>
+                <a:solidFill>
+                  <a:srgbClr val="FFFFFF"/>
+                </a:solidFill>
+                <a:effectLst>
+                  <a:outerShdw blurRad="38100" dist="22860" dir="5400000" algn="tl" rotWithShape="0">
+                    <a:srgbClr val="000000">
+                      <a:alpha val="30000"/>
+                    </a:srgbClr>
+                  </a:outerShdw>
+                </a:effectLst>
+              </a:rPr>
+              <a:t>Classification</a:t>
+            </a:r>
+          </a:p>
+        </p:txBody>
+      </p:sp>
+      <p:sp>
+        <p:nvSpPr>
+          <p:cNvPr id="3" name="Rectangle 2">
+            <a:extLst>
+              <a:ext uri="{FF2B5EF4-FFF2-40B4-BE49-F238E27FC236}">
+                <a16:creationId xmlns:a16="http://schemas.microsoft.com/office/drawing/2014/main" id="{17B300DD-505E-4E71-AF3D-93A6037B5063}"/>
+              </a:ext>
+            </a:extLst>
+          </p:cNvPr>
+          <p:cNvSpPr/>
+          <p:nvPr/>
+        </p:nvSpPr>
+        <p:spPr>
+          <a:xfrm rot="18742739">
+            <a:off x="-803462" y="508780"/>
+            <a:ext cx="3207124" cy="595732"/>
+          </a:xfrm>
+          <a:prstGeom prst="rect">
+            <a:avLst/>
+          </a:prstGeom>
+        </p:spPr>
+        <p:style>
+          <a:lnRef idx="2">
+            <a:schemeClr val="accent4">
+              <a:shade val="50000"/>
+            </a:schemeClr>
+          </a:lnRef>
+          <a:fillRef idx="1">
+            <a:schemeClr val="accent4"/>
+          </a:fillRef>
+          <a:effectRef idx="0">
+            <a:schemeClr val="accent4"/>
+          </a:effectRef>
+          <a:fontRef idx="minor">
+            <a:schemeClr val="lt1"/>
+          </a:fontRef>
+        </p:style>
+        <p:txBody>
+          <a:bodyPr rtlCol="0" anchor="ctr"/>
+          <a:lstStyle/>
+          <a:p>
+            <a:pPr algn="ctr"/>
+            <a:r>
+              <a:rPr lang="en-US" sz="2400" b="1" dirty="0"/>
+              <a:t>Tour Version</a:t>
+            </a:r>
+          </a:p>
+        </p:txBody>
+      </p:sp>
+    </p:spTree>
+    <p:extLst>
+      <p:ext uri="{BB962C8B-B14F-4D97-AF65-F5344CB8AC3E}">
+        <p14:creationId xmlns:p14="http://schemas.microsoft.com/office/powerpoint/2010/main" val="247681794"/>
+      </p:ext>
+    </p:extLst>
+  </p:cSld>
+  <p:clrMapOvr>
+    <a:masterClrMapping/>
+  </p:clrMapOvr>
+</p:sld>
+</file>
+
+<file path=ppt/slides/slide6.xml><?xml version="1.0" encoding="utf-8"?>
+<p:sld xmlns:a="http://schemas.openxmlformats.org/drawingml/2006/main" xmlns:r="http://schemas.openxmlformats.org/officeDocument/2006/relationships" xmlns:p="http://schemas.openxmlformats.org/presentationml/2006/main">
+  <p:cSld>
+    <p:spTree>
+      <p:nvGrpSpPr>
+        <p:cNvPr id="1" name=""/>
+        <p:cNvGrpSpPr/>
+        <p:nvPr/>
+      </p:nvGrpSpPr>
+      <p:grpSpPr>
+        <a:xfrm>
+          <a:off x="0" y="0"/>
+          <a:ext cx="0" cy="0"/>
+          <a:chOff x="0" y="0"/>
+          <a:chExt cx="0" cy="0"/>
+        </a:xfrm>
+      </p:grpSpPr>
+      <p:sp>
+        <p:nvSpPr>
+          <p:cNvPr id="5" name="Oval 4">
+            <a:extLst>
+              <a:ext uri="{FF2B5EF4-FFF2-40B4-BE49-F238E27FC236}">
+                <a16:creationId xmlns:a16="http://schemas.microsoft.com/office/drawing/2014/main" id="{9229F4DE-F8F2-4F2F-B190-5EF21C76F9FB}"/>
+              </a:ext>
+            </a:extLst>
+          </p:cNvPr>
+          <p:cNvSpPr/>
+          <p:nvPr/>
+        </p:nvSpPr>
+        <p:spPr>
+          <a:xfrm>
+            <a:off x="800100" y="2739979"/>
+            <a:ext cx="5257800" cy="4777348"/>
+          </a:xfrm>
+          <a:prstGeom prst="ellipse">
+            <a:avLst/>
+          </a:prstGeom>
+          <a:noFill/>
+          <a:ln w="9525" cap="flat" cmpd="sng" algn="ctr">
+            <a:solidFill>
+              <a:schemeClr val="accent3"/>
+            </a:solidFill>
+            <a:prstDash val="solid"/>
+            <a:round/>
+            <a:headEnd type="none" w="med" len="med"/>
+            <a:tailEnd type="none" w="med" len="med"/>
+          </a:ln>
+        </p:spPr>
+        <p:style>
+          <a:lnRef idx="0">
+            <a:scrgbClr r="0" g="0" b="0"/>
+          </a:lnRef>
+          <a:fillRef idx="0">
+            <a:scrgbClr r="0" g="0" b="0"/>
+          </a:fillRef>
+          <a:effectRef idx="0">
+            <a:scrgbClr r="0" g="0" b="0"/>
+          </a:effectRef>
+          <a:fontRef idx="minor">
+            <a:schemeClr val="accent3"/>
+          </a:fontRef>
+        </p:style>
+        <p:txBody>
+          <a:bodyPr rtlCol="0" anchor="ctr"/>
+          <a:lstStyle/>
+          <a:p>
+            <a:pPr algn="ctr"/>
+            <a:endParaRPr lang="en-US" dirty="0"/>
+          </a:p>
+        </p:txBody>
+      </p:sp>
+      <p:sp>
+        <p:nvSpPr>
+          <p:cNvPr id="4" name="Rectangle 3">
+            <a:extLst>
+              <a:ext uri="{FF2B5EF4-FFF2-40B4-BE49-F238E27FC236}">
+                <a16:creationId xmlns:a16="http://schemas.microsoft.com/office/drawing/2014/main" id="{5ED97542-AAD4-4C86-B407-6E27E98BB98E}"/>
+              </a:ext>
+            </a:extLst>
+          </p:cNvPr>
+          <p:cNvSpPr/>
+          <p:nvPr/>
+        </p:nvSpPr>
+        <p:spPr>
+          <a:xfrm>
+            <a:off x="1623281" y="6015318"/>
+            <a:ext cx="3611437" cy="923330"/>
+          </a:xfrm>
+          <a:prstGeom prst="rect">
+            <a:avLst/>
+          </a:prstGeom>
+          <a:noFill/>
+        </p:spPr>
+        <p:txBody>
+          <a:bodyPr wrap="none" lIns="91440" tIns="45720" rIns="91440" bIns="45720">
+            <a:spAutoFit/>
+          </a:bodyPr>
+          <a:lstStyle/>
+          <a:p>
+            <a:pPr algn="ctr"/>
+            <a:r>
+              <a:rPr lang="en-US" sz="5400" b="0" cap="none" spc="0" dirty="0">
+                <a:ln w="0"/>
+                <a:solidFill>
+                  <a:schemeClr val="accent1"/>
+                </a:solidFill>
+                <a:effectLst>
+                  <a:outerShdw blurRad="38100" dist="25400" dir="5400000" algn="ctr" rotWithShape="0">
+                    <a:srgbClr val="6E747A">
+                      <a:alpha val="43000"/>
+                    </a:srgbClr>
+                  </a:outerShdw>
+                </a:effectLst>
+              </a:rPr>
+              <a:t>Data Mining</a:t>
+            </a:r>
+          </a:p>
+        </p:txBody>
+      </p:sp>
+      <p:pic>
+        <p:nvPicPr>
+          <p:cNvPr id="1028" name="Picture 4" descr="Networking Network Security Projects at Rs 15000/on wards ...">
+            <a:extLst>
+              <a:ext uri="{FF2B5EF4-FFF2-40B4-BE49-F238E27FC236}">
+                <a16:creationId xmlns:a16="http://schemas.microsoft.com/office/drawing/2014/main" id="{62A8AC9D-1293-4E53-B156-9C7447418BEC}"/>
+              </a:ext>
+            </a:extLst>
+          </p:cNvPr>
+          <p:cNvPicPr>
+            <a:picLocks noChangeAspect="1" noChangeArrowheads="1"/>
+          </p:cNvPicPr>
+          <p:nvPr/>
+        </p:nvPicPr>
+        <p:blipFill>
+          <a:blip r:embed="rId2">
+            <a:extLst>
+              <a:ext uri="{28A0092B-C50C-407E-A947-70E740481C1C}">
+                <a14:useLocalDpi xmlns:a14="http://schemas.microsoft.com/office/drawing/2010/main" val="0"/>
+              </a:ext>
+            </a:extLst>
+          </a:blip>
+          <a:srcRect/>
+          <a:stretch>
+            <a:fillRect/>
+          </a:stretch>
+        </p:blipFill>
+        <p:spPr bwMode="auto">
+          <a:xfrm>
+            <a:off x="1" y="0"/>
+            <a:ext cx="6858000" cy="4777348"/>
+          </a:xfrm>
+          <a:prstGeom prst="rect">
+            <a:avLst/>
+          </a:prstGeom>
+          <a:noFill/>
+          <a:extLst>
+            <a:ext uri="{909E8E84-426E-40DD-AFC4-6F175D3DCCD1}">
+              <a14:hiddenFill xmlns:a14="http://schemas.microsoft.com/office/drawing/2010/main">
+                <a:solidFill>
+                  <a:srgbClr val="FFFFFF"/>
+                </a:solidFill>
+              </a14:hiddenFill>
+            </a:ext>
+          </a:extLst>
+        </p:spPr>
+      </p:pic>
+      <p:pic>
+        <p:nvPicPr>
+          <p:cNvPr id="1026" name="Picture 2" descr="5 Benefits of Data Mining for your Marketing Strategy: Part 1">
+            <a:extLst>
+              <a:ext uri="{FF2B5EF4-FFF2-40B4-BE49-F238E27FC236}">
+                <a16:creationId xmlns:a16="http://schemas.microsoft.com/office/drawing/2014/main" id="{9CEF86DF-35FF-462A-A238-516093124CE9}"/>
+              </a:ext>
+            </a:extLst>
+          </p:cNvPr>
+          <p:cNvPicPr>
+            <a:picLocks noChangeAspect="1" noChangeArrowheads="1"/>
+          </p:cNvPicPr>
+          <p:nvPr/>
+        </p:nvPicPr>
+        <p:blipFill>
+          <a:blip r:embed="rId3">
+            <a:extLst>
+              <a:ext uri="{28A0092B-C50C-407E-A947-70E740481C1C}">
+                <a14:useLocalDpi xmlns:a14="http://schemas.microsoft.com/office/drawing/2010/main" val="0"/>
+              </a:ext>
+            </a:extLst>
+          </a:blip>
+          <a:srcRect/>
+          <a:stretch>
+            <a:fillRect/>
+          </a:stretch>
+        </p:blipFill>
+        <p:spPr bwMode="auto">
+          <a:xfrm>
+            <a:off x="1905000" y="3101788"/>
+            <a:ext cx="3048000" cy="3048000"/>
+          </a:xfrm>
+          <a:prstGeom prst="rect">
+            <a:avLst/>
+          </a:prstGeom>
+          <a:noFill/>
+          <a:extLst>
+            <a:ext uri="{909E8E84-426E-40DD-AFC4-6F175D3DCCD1}">
+              <a14:hiddenFill xmlns:a14="http://schemas.microsoft.com/office/drawing/2010/main">
+                <a:solidFill>
+                  <a:srgbClr val="FFFFFF"/>
+                </a:solidFill>
+              </a14:hiddenFill>
+            </a:ext>
+          </a:extLst>
+        </p:spPr>
+      </p:pic>
+      <p:sp>
+        <p:nvSpPr>
+          <p:cNvPr id="2" name="Rectangle 1">
+            <a:extLst>
+              <a:ext uri="{FF2B5EF4-FFF2-40B4-BE49-F238E27FC236}">
+                <a16:creationId xmlns:a16="http://schemas.microsoft.com/office/drawing/2014/main" id="{B3BFBFE3-7D46-42C3-8C92-078F3521080C}"/>
+              </a:ext>
+            </a:extLst>
+          </p:cNvPr>
+          <p:cNvSpPr/>
+          <p:nvPr/>
+        </p:nvSpPr>
+        <p:spPr>
+          <a:xfrm>
+            <a:off x="2060687" y="7517327"/>
+            <a:ext cx="2736647" cy="1569660"/>
+          </a:xfrm>
+          <a:prstGeom prst="rect">
+            <a:avLst/>
+          </a:prstGeom>
+          <a:noFill/>
+        </p:spPr>
+        <p:txBody>
+          <a:bodyPr wrap="none" lIns="91440" tIns="45720" rIns="91440" bIns="45720">
+            <a:spAutoFit/>
+          </a:bodyPr>
+          <a:lstStyle/>
+          <a:p>
+            <a:pPr algn="ctr"/>
+            <a:r>
+              <a:rPr lang="en-US" sz="4800" b="1" cap="none" spc="0" dirty="0">
+                <a:ln w="10160">
+                  <a:solidFill>
+                    <a:schemeClr val="accent5"/>
+                  </a:solidFill>
+                  <a:prstDash val="solid"/>
+                </a:ln>
+                <a:solidFill>
+                  <a:srgbClr val="FFFFFF"/>
+                </a:solidFill>
+                <a:effectLst>
+                  <a:outerShdw blurRad="38100" dist="22860" dir="5400000" algn="tl" rotWithShape="0">
+                    <a:srgbClr val="000000">
+                      <a:alpha val="30000"/>
+                    </a:srgbClr>
+                  </a:outerShdw>
+                </a:effectLst>
+              </a:rPr>
+              <a:t> Tour </a:t>
+            </a:r>
+            <a:r>
+              <a:rPr lang="ar-EG" sz="4800" b="1" dirty="0">
+                <a:ln w="10160">
+                  <a:solidFill>
+                    <a:schemeClr val="accent5"/>
+                  </a:solidFill>
+                  <a:prstDash val="solid"/>
+                </a:ln>
+                <a:solidFill>
+                  <a:srgbClr val="FFFFFF"/>
+                </a:solidFill>
+                <a:effectLst>
+                  <a:outerShdw blurRad="38100" dist="22860" dir="5400000" algn="tl" rotWithShape="0">
+                    <a:srgbClr val="000000">
+                      <a:alpha val="30000"/>
+                    </a:srgbClr>
+                  </a:outerShdw>
+                </a:effectLst>
+              </a:rPr>
+              <a:t>5</a:t>
+            </a:r>
+            <a:endParaRPr lang="en-US" sz="4800" b="1" cap="none" spc="0" dirty="0">
+              <a:ln w="10160">
+                <a:solidFill>
+                  <a:schemeClr val="accent5"/>
+                </a:solidFill>
+                <a:prstDash val="solid"/>
+              </a:ln>
+              <a:solidFill>
+                <a:srgbClr val="FFFFFF"/>
+              </a:solidFill>
+              <a:effectLst>
+                <a:outerShdw blurRad="38100" dist="22860" dir="5400000" algn="tl" rotWithShape="0">
+                  <a:srgbClr val="000000">
+                    <a:alpha val="30000"/>
+                  </a:srgbClr>
+                </a:outerShdw>
+              </a:effectLst>
+            </a:endParaRPr>
+          </a:p>
+          <a:p>
+            <a:pPr algn="ctr"/>
+            <a:r>
+              <a:rPr lang="en-US" sz="4800" b="1">
+                <a:ln w="10160">
+                  <a:solidFill>
+                    <a:schemeClr val="accent5"/>
+                  </a:solidFill>
+                  <a:prstDash val="solid"/>
+                </a:ln>
+                <a:solidFill>
+                  <a:srgbClr val="FFFFFF"/>
+                </a:solidFill>
+                <a:effectLst>
+                  <a:outerShdw blurRad="38100" dist="22860" dir="5400000" algn="tl" rotWithShape="0">
+                    <a:srgbClr val="000000">
+                      <a:alpha val="30000"/>
+                    </a:srgbClr>
+                  </a:outerShdw>
+                </a:effectLst>
+              </a:rPr>
+              <a:t>Clustering</a:t>
+            </a:r>
+            <a:endParaRPr lang="en-US" sz="4800" b="1" cap="none" spc="0" dirty="0">
+              <a:ln w="10160">
+                <a:solidFill>
+                  <a:schemeClr val="accent5"/>
+                </a:solidFill>
+                <a:prstDash val="solid"/>
+              </a:ln>
+              <a:solidFill>
+                <a:srgbClr val="FFFFFF"/>
+              </a:solidFill>
+              <a:effectLst>
+                <a:outerShdw blurRad="38100" dist="22860" dir="5400000" algn="tl" rotWithShape="0">
+                  <a:srgbClr val="000000">
+                    <a:alpha val="30000"/>
+                  </a:srgbClr>
+                </a:outerShdw>
+              </a:effectLst>
+            </a:endParaRPr>
+          </a:p>
+        </p:txBody>
+      </p:sp>
+      <p:sp>
+        <p:nvSpPr>
+          <p:cNvPr id="3" name="Rectangle 2">
+            <a:extLst>
+              <a:ext uri="{FF2B5EF4-FFF2-40B4-BE49-F238E27FC236}">
+                <a16:creationId xmlns:a16="http://schemas.microsoft.com/office/drawing/2014/main" id="{17B300DD-505E-4E71-AF3D-93A6037B5063}"/>
+              </a:ext>
+            </a:extLst>
+          </p:cNvPr>
+          <p:cNvSpPr/>
+          <p:nvPr/>
+        </p:nvSpPr>
+        <p:spPr>
+          <a:xfrm rot="18742739">
+            <a:off x="-803462" y="508780"/>
+            <a:ext cx="3207124" cy="595732"/>
+          </a:xfrm>
+          <a:prstGeom prst="rect">
+            <a:avLst/>
+          </a:prstGeom>
+        </p:spPr>
+        <p:style>
+          <a:lnRef idx="2">
+            <a:schemeClr val="accent4">
+              <a:shade val="50000"/>
+            </a:schemeClr>
+          </a:lnRef>
+          <a:fillRef idx="1">
+            <a:schemeClr val="accent4"/>
+          </a:fillRef>
+          <a:effectRef idx="0">
+            <a:schemeClr val="accent4"/>
+          </a:effectRef>
+          <a:fontRef idx="minor">
+            <a:schemeClr val="lt1"/>
+          </a:fontRef>
+        </p:style>
+        <p:txBody>
+          <a:bodyPr rtlCol="0" anchor="ctr"/>
+          <a:lstStyle/>
+          <a:p>
+            <a:pPr algn="ctr"/>
+            <a:r>
+              <a:rPr lang="en-US" sz="2400" b="1" dirty="0"/>
+              <a:t>Tour Version</a:t>
+            </a:r>
+          </a:p>
+        </p:txBody>
+      </p:sp>
+    </p:spTree>
+    <p:extLst>
+      <p:ext uri="{BB962C8B-B14F-4D97-AF65-F5344CB8AC3E}">
+        <p14:creationId xmlns:p14="http://schemas.microsoft.com/office/powerpoint/2010/main" val="2882067229"/>
+      </p:ext>
+    </p:extLst>
+  </p:cSld>
+  <p:clrMapOvr>
+    <a:masterClrMapping/>
+  </p:clrMapOvr>
+</p:sld>
+</file>
+
 <file path=ppt/theme/theme1.xml><?xml version="1.0" encoding="utf-8"?>
 <a:theme xmlns:a="http://schemas.openxmlformats.org/drawingml/2006/main" name="Office Theme">
   <a:themeElements>

</xml_diff>

<commit_message>
Adding The Materials before Last Exam
</commit_message>
<xml_diff>
--- a/DataMining{Dr_Sara_Shaker&Dr_Amira_Rizk}/Helping/Cover.pptx
+++ b/DataMining{Dr_Sara_Shaker&Dr_Amira_Rizk}/Helping/Cover.pptx
@@ -11,6 +11,8 @@
     <p:sldId id="259" r:id="rId5"/>
     <p:sldId id="260" r:id="rId6"/>
     <p:sldId id="261" r:id="rId7"/>
+    <p:sldId id="262" r:id="rId8"/>
+    <p:sldId id="263" r:id="rId9"/>
   </p:sldIdLst>
   <p:sldSz cx="6858000" cy="9906000" type="A4"/>
   <p:notesSz cx="6858000" cy="9144000"/>
@@ -248,7 +250,7 @@
           <a:p>
             <a:fld id="{B3273CB4-2363-4939-B93D-48CB9EB232D4}" type="datetimeFigureOut">
               <a:rPr lang="en-US" smtClean="0"/>
-              <a:t>6/4/2020</a:t>
+              <a:t>6/13/2020</a:t>
             </a:fld>
             <a:endParaRPr lang="en-US"/>
           </a:p>
@@ -418,7 +420,7 @@
           <a:p>
             <a:fld id="{B3273CB4-2363-4939-B93D-48CB9EB232D4}" type="datetimeFigureOut">
               <a:rPr lang="en-US" smtClean="0"/>
-              <a:t>6/4/2020</a:t>
+              <a:t>6/13/2020</a:t>
             </a:fld>
             <a:endParaRPr lang="en-US"/>
           </a:p>
@@ -598,7 +600,7 @@
           <a:p>
             <a:fld id="{B3273CB4-2363-4939-B93D-48CB9EB232D4}" type="datetimeFigureOut">
               <a:rPr lang="en-US" smtClean="0"/>
-              <a:t>6/4/2020</a:t>
+              <a:t>6/13/2020</a:t>
             </a:fld>
             <a:endParaRPr lang="en-US"/>
           </a:p>
@@ -768,7 +770,7 @@
           <a:p>
             <a:fld id="{B3273CB4-2363-4939-B93D-48CB9EB232D4}" type="datetimeFigureOut">
               <a:rPr lang="en-US" smtClean="0"/>
-              <a:t>6/4/2020</a:t>
+              <a:t>6/13/2020</a:t>
             </a:fld>
             <a:endParaRPr lang="en-US"/>
           </a:p>
@@ -1012,7 +1014,7 @@
           <a:p>
             <a:fld id="{B3273CB4-2363-4939-B93D-48CB9EB232D4}" type="datetimeFigureOut">
               <a:rPr lang="en-US" smtClean="0"/>
-              <a:t>6/4/2020</a:t>
+              <a:t>6/13/2020</a:t>
             </a:fld>
             <a:endParaRPr lang="en-US"/>
           </a:p>
@@ -1244,7 +1246,7 @@
           <a:p>
             <a:fld id="{B3273CB4-2363-4939-B93D-48CB9EB232D4}" type="datetimeFigureOut">
               <a:rPr lang="en-US" smtClean="0"/>
-              <a:t>6/4/2020</a:t>
+              <a:t>6/13/2020</a:t>
             </a:fld>
             <a:endParaRPr lang="en-US"/>
           </a:p>
@@ -1611,7 +1613,7 @@
           <a:p>
             <a:fld id="{B3273CB4-2363-4939-B93D-48CB9EB232D4}" type="datetimeFigureOut">
               <a:rPr lang="en-US" smtClean="0"/>
-              <a:t>6/4/2020</a:t>
+              <a:t>6/13/2020</a:t>
             </a:fld>
             <a:endParaRPr lang="en-US"/>
           </a:p>
@@ -1729,7 +1731,7 @@
           <a:p>
             <a:fld id="{B3273CB4-2363-4939-B93D-48CB9EB232D4}" type="datetimeFigureOut">
               <a:rPr lang="en-US" smtClean="0"/>
-              <a:t>6/4/2020</a:t>
+              <a:t>6/13/2020</a:t>
             </a:fld>
             <a:endParaRPr lang="en-US"/>
           </a:p>
@@ -1824,7 +1826,7 @@
           <a:p>
             <a:fld id="{B3273CB4-2363-4939-B93D-48CB9EB232D4}" type="datetimeFigureOut">
               <a:rPr lang="en-US" smtClean="0"/>
-              <a:t>6/4/2020</a:t>
+              <a:t>6/13/2020</a:t>
             </a:fld>
             <a:endParaRPr lang="en-US"/>
           </a:p>
@@ -2101,7 +2103,7 @@
           <a:p>
             <a:fld id="{B3273CB4-2363-4939-B93D-48CB9EB232D4}" type="datetimeFigureOut">
               <a:rPr lang="en-US" smtClean="0"/>
-              <a:t>6/4/2020</a:t>
+              <a:t>6/13/2020</a:t>
             </a:fld>
             <a:endParaRPr lang="en-US"/>
           </a:p>
@@ -2358,7 +2360,7 @@
           <a:p>
             <a:fld id="{B3273CB4-2363-4939-B93D-48CB9EB232D4}" type="datetimeFigureOut">
               <a:rPr lang="en-US" smtClean="0"/>
-              <a:t>6/4/2020</a:t>
+              <a:t>6/13/2020</a:t>
             </a:fld>
             <a:endParaRPr lang="en-US"/>
           </a:p>
@@ -2571,7 +2573,7 @@
           <a:p>
             <a:fld id="{B3273CB4-2363-4939-B93D-48CB9EB232D4}" type="datetimeFigureOut">
               <a:rPr lang="en-US" smtClean="0"/>
-              <a:t>6/4/2020</a:t>
+              <a:t>6/13/2020</a:t>
             </a:fld>
             <a:endParaRPr lang="en-US"/>
           </a:p>
@@ -5002,6 +5004,704 @@
 </p:sld>
 </file>
 
+<file path=ppt/slides/slide7.xml><?xml version="1.0" encoding="utf-8"?>
+<p:sld xmlns:a="http://schemas.openxmlformats.org/drawingml/2006/main" xmlns:r="http://schemas.openxmlformats.org/officeDocument/2006/relationships" xmlns:p="http://schemas.openxmlformats.org/presentationml/2006/main">
+  <p:cSld>
+    <p:spTree>
+      <p:nvGrpSpPr>
+        <p:cNvPr id="1" name=""/>
+        <p:cNvGrpSpPr/>
+        <p:nvPr/>
+      </p:nvGrpSpPr>
+      <p:grpSpPr>
+        <a:xfrm>
+          <a:off x="0" y="0"/>
+          <a:ext cx="0" cy="0"/>
+          <a:chOff x="0" y="0"/>
+          <a:chExt cx="0" cy="0"/>
+        </a:xfrm>
+      </p:grpSpPr>
+      <p:sp>
+        <p:nvSpPr>
+          <p:cNvPr id="5" name="Oval 4">
+            <a:extLst>
+              <a:ext uri="{FF2B5EF4-FFF2-40B4-BE49-F238E27FC236}">
+                <a16:creationId xmlns:a16="http://schemas.microsoft.com/office/drawing/2014/main" id="{9229F4DE-F8F2-4F2F-B190-5EF21C76F9FB}"/>
+              </a:ext>
+            </a:extLst>
+          </p:cNvPr>
+          <p:cNvSpPr/>
+          <p:nvPr/>
+        </p:nvSpPr>
+        <p:spPr>
+          <a:xfrm>
+            <a:off x="800100" y="2739979"/>
+            <a:ext cx="5257800" cy="4777348"/>
+          </a:xfrm>
+          <a:prstGeom prst="ellipse">
+            <a:avLst/>
+          </a:prstGeom>
+          <a:noFill/>
+          <a:ln w="9525" cap="flat" cmpd="sng" algn="ctr">
+            <a:solidFill>
+              <a:schemeClr val="accent3"/>
+            </a:solidFill>
+            <a:prstDash val="solid"/>
+            <a:round/>
+            <a:headEnd type="none" w="med" len="med"/>
+            <a:tailEnd type="none" w="med" len="med"/>
+          </a:ln>
+        </p:spPr>
+        <p:style>
+          <a:lnRef idx="0">
+            <a:scrgbClr r="0" g="0" b="0"/>
+          </a:lnRef>
+          <a:fillRef idx="0">
+            <a:scrgbClr r="0" g="0" b="0"/>
+          </a:fillRef>
+          <a:effectRef idx="0">
+            <a:scrgbClr r="0" g="0" b="0"/>
+          </a:effectRef>
+          <a:fontRef idx="minor">
+            <a:schemeClr val="accent3"/>
+          </a:fontRef>
+        </p:style>
+        <p:txBody>
+          <a:bodyPr rtlCol="0" anchor="ctr"/>
+          <a:lstStyle/>
+          <a:p>
+            <a:pPr algn="ctr"/>
+            <a:endParaRPr lang="en-US" dirty="0"/>
+          </a:p>
+        </p:txBody>
+      </p:sp>
+      <p:sp>
+        <p:nvSpPr>
+          <p:cNvPr id="4" name="Rectangle 3">
+            <a:extLst>
+              <a:ext uri="{FF2B5EF4-FFF2-40B4-BE49-F238E27FC236}">
+                <a16:creationId xmlns:a16="http://schemas.microsoft.com/office/drawing/2014/main" id="{5ED97542-AAD4-4C86-B407-6E27E98BB98E}"/>
+              </a:ext>
+            </a:extLst>
+          </p:cNvPr>
+          <p:cNvSpPr/>
+          <p:nvPr/>
+        </p:nvSpPr>
+        <p:spPr>
+          <a:xfrm>
+            <a:off x="1623281" y="6015318"/>
+            <a:ext cx="3611437" cy="923330"/>
+          </a:xfrm>
+          <a:prstGeom prst="rect">
+            <a:avLst/>
+          </a:prstGeom>
+          <a:noFill/>
+        </p:spPr>
+        <p:txBody>
+          <a:bodyPr wrap="none" lIns="91440" tIns="45720" rIns="91440" bIns="45720">
+            <a:spAutoFit/>
+          </a:bodyPr>
+          <a:lstStyle/>
+          <a:p>
+            <a:pPr algn="ctr"/>
+            <a:r>
+              <a:rPr lang="en-US" sz="5400" b="0" cap="none" spc="0" dirty="0">
+                <a:ln w="0"/>
+                <a:solidFill>
+                  <a:schemeClr val="accent1"/>
+                </a:solidFill>
+                <a:effectLst>
+                  <a:outerShdw blurRad="38100" dist="25400" dir="5400000" algn="ctr" rotWithShape="0">
+                    <a:srgbClr val="6E747A">
+                      <a:alpha val="43000"/>
+                    </a:srgbClr>
+                  </a:outerShdw>
+                </a:effectLst>
+              </a:rPr>
+              <a:t>Data Mining</a:t>
+            </a:r>
+          </a:p>
+        </p:txBody>
+      </p:sp>
+      <p:pic>
+        <p:nvPicPr>
+          <p:cNvPr id="1028" name="Picture 4" descr="Networking Network Security Projects at Rs 15000/on wards ...">
+            <a:extLst>
+              <a:ext uri="{FF2B5EF4-FFF2-40B4-BE49-F238E27FC236}">
+                <a16:creationId xmlns:a16="http://schemas.microsoft.com/office/drawing/2014/main" id="{62A8AC9D-1293-4E53-B156-9C7447418BEC}"/>
+              </a:ext>
+            </a:extLst>
+          </p:cNvPr>
+          <p:cNvPicPr>
+            <a:picLocks noChangeAspect="1" noChangeArrowheads="1"/>
+          </p:cNvPicPr>
+          <p:nvPr/>
+        </p:nvPicPr>
+        <p:blipFill>
+          <a:blip r:embed="rId2">
+            <a:extLst>
+              <a:ext uri="{28A0092B-C50C-407E-A947-70E740481C1C}">
+                <a14:useLocalDpi xmlns:a14="http://schemas.microsoft.com/office/drawing/2010/main" val="0"/>
+              </a:ext>
+            </a:extLst>
+          </a:blip>
+          <a:srcRect/>
+          <a:stretch>
+            <a:fillRect/>
+          </a:stretch>
+        </p:blipFill>
+        <p:spPr bwMode="auto">
+          <a:xfrm>
+            <a:off x="1" y="0"/>
+            <a:ext cx="6858000" cy="4777348"/>
+          </a:xfrm>
+          <a:prstGeom prst="rect">
+            <a:avLst/>
+          </a:prstGeom>
+          <a:noFill/>
+          <a:extLst>
+            <a:ext uri="{909E8E84-426E-40DD-AFC4-6F175D3DCCD1}">
+              <a14:hiddenFill xmlns:a14="http://schemas.microsoft.com/office/drawing/2010/main">
+                <a:solidFill>
+                  <a:srgbClr val="FFFFFF"/>
+                </a:solidFill>
+              </a14:hiddenFill>
+            </a:ext>
+          </a:extLst>
+        </p:spPr>
+      </p:pic>
+      <p:pic>
+        <p:nvPicPr>
+          <p:cNvPr id="1026" name="Picture 2" descr="5 Benefits of Data Mining for your Marketing Strategy: Part 1">
+            <a:extLst>
+              <a:ext uri="{FF2B5EF4-FFF2-40B4-BE49-F238E27FC236}">
+                <a16:creationId xmlns:a16="http://schemas.microsoft.com/office/drawing/2014/main" id="{9CEF86DF-35FF-462A-A238-516093124CE9}"/>
+              </a:ext>
+            </a:extLst>
+          </p:cNvPr>
+          <p:cNvPicPr>
+            <a:picLocks noChangeAspect="1" noChangeArrowheads="1"/>
+          </p:cNvPicPr>
+          <p:nvPr/>
+        </p:nvPicPr>
+        <p:blipFill>
+          <a:blip r:embed="rId3">
+            <a:extLst>
+              <a:ext uri="{28A0092B-C50C-407E-A947-70E740481C1C}">
+                <a14:useLocalDpi xmlns:a14="http://schemas.microsoft.com/office/drawing/2010/main" val="0"/>
+              </a:ext>
+            </a:extLst>
+          </a:blip>
+          <a:srcRect/>
+          <a:stretch>
+            <a:fillRect/>
+          </a:stretch>
+        </p:blipFill>
+        <p:spPr bwMode="auto">
+          <a:xfrm>
+            <a:off x="1905000" y="3101788"/>
+            <a:ext cx="3048000" cy="3048000"/>
+          </a:xfrm>
+          <a:prstGeom prst="rect">
+            <a:avLst/>
+          </a:prstGeom>
+          <a:noFill/>
+          <a:extLst>
+            <a:ext uri="{909E8E84-426E-40DD-AFC4-6F175D3DCCD1}">
+              <a14:hiddenFill xmlns:a14="http://schemas.microsoft.com/office/drawing/2010/main">
+                <a:solidFill>
+                  <a:srgbClr val="FFFFFF"/>
+                </a:solidFill>
+              </a14:hiddenFill>
+            </a:ext>
+          </a:extLst>
+        </p:spPr>
+      </p:pic>
+      <p:sp>
+        <p:nvSpPr>
+          <p:cNvPr id="2" name="Rectangle 1">
+            <a:extLst>
+              <a:ext uri="{FF2B5EF4-FFF2-40B4-BE49-F238E27FC236}">
+                <a16:creationId xmlns:a16="http://schemas.microsoft.com/office/drawing/2014/main" id="{B3BFBFE3-7D46-42C3-8C92-078F3521080C}"/>
+              </a:ext>
+            </a:extLst>
+          </p:cNvPr>
+          <p:cNvSpPr/>
+          <p:nvPr/>
+        </p:nvSpPr>
+        <p:spPr>
+          <a:xfrm>
+            <a:off x="384368" y="7517327"/>
+            <a:ext cx="6089296" cy="830997"/>
+          </a:xfrm>
+          <a:prstGeom prst="rect">
+            <a:avLst/>
+          </a:prstGeom>
+          <a:noFill/>
+        </p:spPr>
+        <p:txBody>
+          <a:bodyPr wrap="none" lIns="91440" tIns="45720" rIns="91440" bIns="45720">
+            <a:spAutoFit/>
+          </a:bodyPr>
+          <a:lstStyle/>
+          <a:p>
+            <a:pPr algn="ctr"/>
+            <a:r>
+              <a:rPr lang="en-US" sz="4800" b="1" cap="none" spc="0" dirty="0">
+                <a:ln w="10160">
+                  <a:solidFill>
+                    <a:schemeClr val="accent5"/>
+                  </a:solidFill>
+                  <a:prstDash val="solid"/>
+                </a:ln>
+                <a:solidFill>
+                  <a:srgbClr val="FFFFFF"/>
+                </a:solidFill>
+                <a:effectLst>
+                  <a:outerShdw blurRad="38100" dist="22860" dir="5400000" algn="tl" rotWithShape="0">
+                    <a:srgbClr val="000000">
+                      <a:alpha val="30000"/>
+                    </a:srgbClr>
+                  </a:outerShdw>
+                </a:effectLst>
+              </a:rPr>
+              <a:t> Revisions &amp; Workbook</a:t>
+            </a:r>
+          </a:p>
+        </p:txBody>
+      </p:sp>
+      <p:sp>
+        <p:nvSpPr>
+          <p:cNvPr id="3" name="Rectangle 2">
+            <a:extLst>
+              <a:ext uri="{FF2B5EF4-FFF2-40B4-BE49-F238E27FC236}">
+                <a16:creationId xmlns:a16="http://schemas.microsoft.com/office/drawing/2014/main" id="{17B300DD-505E-4E71-AF3D-93A6037B5063}"/>
+              </a:ext>
+            </a:extLst>
+          </p:cNvPr>
+          <p:cNvSpPr/>
+          <p:nvPr/>
+        </p:nvSpPr>
+        <p:spPr>
+          <a:xfrm rot="18742739">
+            <a:off x="-803462" y="508780"/>
+            <a:ext cx="3207124" cy="595732"/>
+          </a:xfrm>
+          <a:prstGeom prst="rect">
+            <a:avLst/>
+          </a:prstGeom>
+        </p:spPr>
+        <p:style>
+          <a:lnRef idx="2">
+            <a:schemeClr val="accent4">
+              <a:shade val="50000"/>
+            </a:schemeClr>
+          </a:lnRef>
+          <a:fillRef idx="1">
+            <a:schemeClr val="accent4"/>
+          </a:fillRef>
+          <a:effectRef idx="0">
+            <a:schemeClr val="accent4"/>
+          </a:effectRef>
+          <a:fontRef idx="minor">
+            <a:schemeClr val="lt1"/>
+          </a:fontRef>
+        </p:style>
+        <p:txBody>
+          <a:bodyPr rtlCol="0" anchor="ctr"/>
+          <a:lstStyle/>
+          <a:p>
+            <a:pPr algn="ctr"/>
+            <a:r>
+              <a:rPr lang="en-US" sz="2400" b="1" dirty="0"/>
+              <a:t>Tour Version</a:t>
+            </a:r>
+          </a:p>
+        </p:txBody>
+      </p:sp>
+    </p:spTree>
+    <p:extLst>
+      <p:ext uri="{BB962C8B-B14F-4D97-AF65-F5344CB8AC3E}">
+        <p14:creationId xmlns:p14="http://schemas.microsoft.com/office/powerpoint/2010/main" val="1849174499"/>
+      </p:ext>
+    </p:extLst>
+  </p:cSld>
+  <p:clrMapOvr>
+    <a:masterClrMapping/>
+  </p:clrMapOvr>
+</p:sld>
+</file>
+
+<file path=ppt/slides/slide8.xml><?xml version="1.0" encoding="utf-8"?>
+<p:sld xmlns:a="http://schemas.openxmlformats.org/drawingml/2006/main" xmlns:r="http://schemas.openxmlformats.org/officeDocument/2006/relationships" xmlns:p="http://schemas.openxmlformats.org/presentationml/2006/main">
+  <p:cSld>
+    <p:spTree>
+      <p:nvGrpSpPr>
+        <p:cNvPr id="1" name=""/>
+        <p:cNvGrpSpPr/>
+        <p:nvPr/>
+      </p:nvGrpSpPr>
+      <p:grpSpPr>
+        <a:xfrm>
+          <a:off x="0" y="0"/>
+          <a:ext cx="0" cy="0"/>
+          <a:chOff x="0" y="0"/>
+          <a:chExt cx="0" cy="0"/>
+        </a:xfrm>
+      </p:grpSpPr>
+      <p:sp>
+        <p:nvSpPr>
+          <p:cNvPr id="5" name="Oval 4">
+            <a:extLst>
+              <a:ext uri="{FF2B5EF4-FFF2-40B4-BE49-F238E27FC236}">
+                <a16:creationId xmlns:a16="http://schemas.microsoft.com/office/drawing/2014/main" id="{9229F4DE-F8F2-4F2F-B190-5EF21C76F9FB}"/>
+              </a:ext>
+            </a:extLst>
+          </p:cNvPr>
+          <p:cNvSpPr/>
+          <p:nvPr/>
+        </p:nvSpPr>
+        <p:spPr>
+          <a:xfrm>
+            <a:off x="800100" y="2739979"/>
+            <a:ext cx="5257800" cy="4777348"/>
+          </a:xfrm>
+          <a:prstGeom prst="ellipse">
+            <a:avLst/>
+          </a:prstGeom>
+          <a:noFill/>
+          <a:ln w="9525" cap="flat" cmpd="sng" algn="ctr">
+            <a:solidFill>
+              <a:schemeClr val="accent3"/>
+            </a:solidFill>
+            <a:prstDash val="solid"/>
+            <a:round/>
+            <a:headEnd type="none" w="med" len="med"/>
+            <a:tailEnd type="none" w="med" len="med"/>
+          </a:ln>
+        </p:spPr>
+        <p:style>
+          <a:lnRef idx="0">
+            <a:scrgbClr r="0" g="0" b="0"/>
+          </a:lnRef>
+          <a:fillRef idx="0">
+            <a:scrgbClr r="0" g="0" b="0"/>
+          </a:fillRef>
+          <a:effectRef idx="0">
+            <a:scrgbClr r="0" g="0" b="0"/>
+          </a:effectRef>
+          <a:fontRef idx="minor">
+            <a:schemeClr val="accent3"/>
+          </a:fontRef>
+        </p:style>
+        <p:txBody>
+          <a:bodyPr rtlCol="0" anchor="ctr"/>
+          <a:lstStyle/>
+          <a:p>
+            <a:pPr algn="ctr"/>
+            <a:endParaRPr lang="en-US" dirty="0"/>
+          </a:p>
+        </p:txBody>
+      </p:sp>
+      <p:sp>
+        <p:nvSpPr>
+          <p:cNvPr id="4" name="Rectangle 3">
+            <a:extLst>
+              <a:ext uri="{FF2B5EF4-FFF2-40B4-BE49-F238E27FC236}">
+                <a16:creationId xmlns:a16="http://schemas.microsoft.com/office/drawing/2014/main" id="{5ED97542-AAD4-4C86-B407-6E27E98BB98E}"/>
+              </a:ext>
+            </a:extLst>
+          </p:cNvPr>
+          <p:cNvSpPr/>
+          <p:nvPr/>
+        </p:nvSpPr>
+        <p:spPr>
+          <a:xfrm>
+            <a:off x="1623281" y="6015318"/>
+            <a:ext cx="3611437" cy="923330"/>
+          </a:xfrm>
+          <a:prstGeom prst="rect">
+            <a:avLst/>
+          </a:prstGeom>
+          <a:noFill/>
+        </p:spPr>
+        <p:txBody>
+          <a:bodyPr wrap="none" lIns="91440" tIns="45720" rIns="91440" bIns="45720">
+            <a:spAutoFit/>
+          </a:bodyPr>
+          <a:lstStyle/>
+          <a:p>
+            <a:pPr algn="ctr"/>
+            <a:r>
+              <a:rPr lang="en-US" sz="5400" b="0" cap="none" spc="0" dirty="0">
+                <a:ln w="0"/>
+                <a:solidFill>
+                  <a:schemeClr val="accent1"/>
+                </a:solidFill>
+                <a:effectLst>
+                  <a:outerShdw blurRad="38100" dist="25400" dir="5400000" algn="ctr" rotWithShape="0">
+                    <a:srgbClr val="6E747A">
+                      <a:alpha val="43000"/>
+                    </a:srgbClr>
+                  </a:outerShdw>
+                </a:effectLst>
+              </a:rPr>
+              <a:t>Data Mining</a:t>
+            </a:r>
+          </a:p>
+        </p:txBody>
+      </p:sp>
+      <p:pic>
+        <p:nvPicPr>
+          <p:cNvPr id="1028" name="Picture 4" descr="Networking Network Security Projects at Rs 15000/on wards ...">
+            <a:extLst>
+              <a:ext uri="{FF2B5EF4-FFF2-40B4-BE49-F238E27FC236}">
+                <a16:creationId xmlns:a16="http://schemas.microsoft.com/office/drawing/2014/main" id="{62A8AC9D-1293-4E53-B156-9C7447418BEC}"/>
+              </a:ext>
+            </a:extLst>
+          </p:cNvPr>
+          <p:cNvPicPr>
+            <a:picLocks noChangeAspect="1" noChangeArrowheads="1"/>
+          </p:cNvPicPr>
+          <p:nvPr/>
+        </p:nvPicPr>
+        <p:blipFill>
+          <a:blip r:embed="rId2">
+            <a:extLst>
+              <a:ext uri="{28A0092B-C50C-407E-A947-70E740481C1C}">
+                <a14:useLocalDpi xmlns:a14="http://schemas.microsoft.com/office/drawing/2010/main" val="0"/>
+              </a:ext>
+            </a:extLst>
+          </a:blip>
+          <a:srcRect/>
+          <a:stretch>
+            <a:fillRect/>
+          </a:stretch>
+        </p:blipFill>
+        <p:spPr bwMode="auto">
+          <a:xfrm>
+            <a:off x="1" y="0"/>
+            <a:ext cx="6858000" cy="4777348"/>
+          </a:xfrm>
+          <a:prstGeom prst="rect">
+            <a:avLst/>
+          </a:prstGeom>
+          <a:noFill/>
+          <a:extLst>
+            <a:ext uri="{909E8E84-426E-40DD-AFC4-6F175D3DCCD1}">
+              <a14:hiddenFill xmlns:a14="http://schemas.microsoft.com/office/drawing/2010/main">
+                <a:solidFill>
+                  <a:srgbClr val="FFFFFF"/>
+                </a:solidFill>
+              </a14:hiddenFill>
+            </a:ext>
+          </a:extLst>
+        </p:spPr>
+      </p:pic>
+      <p:pic>
+        <p:nvPicPr>
+          <p:cNvPr id="1026" name="Picture 2" descr="5 Benefits of Data Mining for your Marketing Strategy: Part 1">
+            <a:extLst>
+              <a:ext uri="{FF2B5EF4-FFF2-40B4-BE49-F238E27FC236}">
+                <a16:creationId xmlns:a16="http://schemas.microsoft.com/office/drawing/2014/main" id="{9CEF86DF-35FF-462A-A238-516093124CE9}"/>
+              </a:ext>
+            </a:extLst>
+          </p:cNvPr>
+          <p:cNvPicPr>
+            <a:picLocks noChangeAspect="1" noChangeArrowheads="1"/>
+          </p:cNvPicPr>
+          <p:nvPr/>
+        </p:nvPicPr>
+        <p:blipFill>
+          <a:blip r:embed="rId3">
+            <a:extLst>
+              <a:ext uri="{28A0092B-C50C-407E-A947-70E740481C1C}">
+                <a14:useLocalDpi xmlns:a14="http://schemas.microsoft.com/office/drawing/2010/main" val="0"/>
+              </a:ext>
+            </a:extLst>
+          </a:blip>
+          <a:srcRect/>
+          <a:stretch>
+            <a:fillRect/>
+          </a:stretch>
+        </p:blipFill>
+        <p:spPr bwMode="auto">
+          <a:xfrm>
+            <a:off x="1905000" y="3101788"/>
+            <a:ext cx="3048000" cy="3048000"/>
+          </a:xfrm>
+          <a:prstGeom prst="rect">
+            <a:avLst/>
+          </a:prstGeom>
+          <a:noFill/>
+          <a:extLst>
+            <a:ext uri="{909E8E84-426E-40DD-AFC4-6F175D3DCCD1}">
+              <a14:hiddenFill xmlns:a14="http://schemas.microsoft.com/office/drawing/2010/main">
+                <a:solidFill>
+                  <a:srgbClr val="FFFFFF"/>
+                </a:solidFill>
+              </a14:hiddenFill>
+            </a:ext>
+          </a:extLst>
+        </p:spPr>
+      </p:pic>
+      <p:sp>
+        <p:nvSpPr>
+          <p:cNvPr id="2" name="Rectangle 1">
+            <a:extLst>
+              <a:ext uri="{FF2B5EF4-FFF2-40B4-BE49-F238E27FC236}">
+                <a16:creationId xmlns:a16="http://schemas.microsoft.com/office/drawing/2014/main" id="{B3BFBFE3-7D46-42C3-8C92-078F3521080C}"/>
+              </a:ext>
+            </a:extLst>
+          </p:cNvPr>
+          <p:cNvSpPr/>
+          <p:nvPr/>
+        </p:nvSpPr>
+        <p:spPr>
+          <a:xfrm>
+            <a:off x="111416" y="7517327"/>
+            <a:ext cx="6635214" cy="1446550"/>
+          </a:xfrm>
+          <a:prstGeom prst="rect">
+            <a:avLst/>
+          </a:prstGeom>
+          <a:noFill/>
+        </p:spPr>
+        <p:txBody>
+          <a:bodyPr wrap="none" lIns="91440" tIns="45720" rIns="91440" bIns="45720">
+            <a:spAutoFit/>
+          </a:bodyPr>
+          <a:lstStyle/>
+          <a:p>
+            <a:pPr algn="ctr"/>
+            <a:r>
+              <a:rPr lang="en-US" sz="4800" b="1" cap="none" spc="0" dirty="0">
+                <a:ln w="10160">
+                  <a:solidFill>
+                    <a:schemeClr val="accent5"/>
+                  </a:solidFill>
+                  <a:prstDash val="solid"/>
+                </a:ln>
+                <a:solidFill>
+                  <a:srgbClr val="FFFFFF"/>
+                </a:solidFill>
+                <a:effectLst>
+                  <a:outerShdw blurRad="38100" dist="22860" dir="5400000" algn="tl" rotWithShape="0">
+                    <a:srgbClr val="000000">
+                      <a:alpha val="30000"/>
+                    </a:srgbClr>
+                  </a:outerShdw>
+                </a:effectLst>
+              </a:rPr>
+              <a:t>Tour 6</a:t>
+            </a:r>
+          </a:p>
+          <a:p>
+            <a:pPr algn="ctr"/>
+            <a:r>
+              <a:rPr lang="en-US" sz="4000" b="1" dirty="0">
+                <a:ln w="10160">
+                  <a:solidFill>
+                    <a:schemeClr val="accent5"/>
+                  </a:solidFill>
+                  <a:prstDash val="solid"/>
+                </a:ln>
+                <a:solidFill>
+                  <a:srgbClr val="FFFFFF"/>
+                </a:solidFill>
+                <a:effectLst>
+                  <a:outerShdw blurRad="38100" dist="22860" dir="5400000" algn="tl" rotWithShape="0">
+                    <a:srgbClr val="000000">
+                      <a:alpha val="30000"/>
+                    </a:srgbClr>
+                  </a:outerShdw>
+                </a:effectLst>
+              </a:rPr>
+              <a:t>Outliers Analysis &amp; DM Trends</a:t>
+            </a:r>
+            <a:endParaRPr lang="en-US" sz="4000" b="1" cap="none" spc="0" dirty="0">
+              <a:ln w="10160">
+                <a:solidFill>
+                  <a:schemeClr val="accent5"/>
+                </a:solidFill>
+                <a:prstDash val="solid"/>
+              </a:ln>
+              <a:solidFill>
+                <a:srgbClr val="FFFFFF"/>
+              </a:solidFill>
+              <a:effectLst>
+                <a:outerShdw blurRad="38100" dist="22860" dir="5400000" algn="tl" rotWithShape="0">
+                  <a:srgbClr val="000000">
+                    <a:alpha val="30000"/>
+                  </a:srgbClr>
+                </a:outerShdw>
+              </a:effectLst>
+            </a:endParaRPr>
+          </a:p>
+        </p:txBody>
+      </p:sp>
+      <p:sp>
+        <p:nvSpPr>
+          <p:cNvPr id="3" name="Rectangle 2">
+            <a:extLst>
+              <a:ext uri="{FF2B5EF4-FFF2-40B4-BE49-F238E27FC236}">
+                <a16:creationId xmlns:a16="http://schemas.microsoft.com/office/drawing/2014/main" id="{17B300DD-505E-4E71-AF3D-93A6037B5063}"/>
+              </a:ext>
+            </a:extLst>
+          </p:cNvPr>
+          <p:cNvSpPr/>
+          <p:nvPr/>
+        </p:nvSpPr>
+        <p:spPr>
+          <a:xfrm rot="18742739">
+            <a:off x="-803462" y="508780"/>
+            <a:ext cx="3207124" cy="595732"/>
+          </a:xfrm>
+          <a:prstGeom prst="rect">
+            <a:avLst/>
+          </a:prstGeom>
+        </p:spPr>
+        <p:style>
+          <a:lnRef idx="2">
+            <a:schemeClr val="accent4">
+              <a:shade val="50000"/>
+            </a:schemeClr>
+          </a:lnRef>
+          <a:fillRef idx="1">
+            <a:schemeClr val="accent4"/>
+          </a:fillRef>
+          <a:effectRef idx="0">
+            <a:schemeClr val="accent4"/>
+          </a:effectRef>
+          <a:fontRef idx="minor">
+            <a:schemeClr val="lt1"/>
+          </a:fontRef>
+        </p:style>
+        <p:txBody>
+          <a:bodyPr rtlCol="0" anchor="ctr"/>
+          <a:lstStyle/>
+          <a:p>
+            <a:pPr algn="ctr"/>
+            <a:r>
+              <a:rPr lang="en-US" sz="2400" b="1" dirty="0"/>
+              <a:t>Tour Version</a:t>
+            </a:r>
+          </a:p>
+        </p:txBody>
+      </p:sp>
+    </p:spTree>
+    <p:extLst>
+      <p:ext uri="{BB962C8B-B14F-4D97-AF65-F5344CB8AC3E}">
+        <p14:creationId xmlns:p14="http://schemas.microsoft.com/office/powerpoint/2010/main" val="1762332587"/>
+      </p:ext>
+    </p:extLst>
+  </p:cSld>
+  <p:clrMapOvr>
+    <a:masterClrMapping/>
+  </p:clrMapOvr>
+</p:sld>
+</file>
+
 <file path=ppt/theme/theme1.xml><?xml version="1.0" encoding="utf-8"?>
 <a:theme xmlns:a="http://schemas.openxmlformats.org/drawingml/2006/main" name="Office Theme">
   <a:themeElements>

</xml_diff>